<commit_message>
more on lambda calculus
</commit_message>
<xml_diff>
--- a/topic04-functions-and-lambda-calculus/unit-04a-lectures/wip/talk-2/b-lambda-calculus.pptx
+++ b/topic04-functions-and-lambda-calculus/unit-04a-lectures/wip/talk-2/b-lambda-calculus.pptx
@@ -5,23 +5,26 @@
     <p:sldMasterId id="2147483666" r:id="rId1"/>
   </p:sldMasterIdLst>
   <p:notesMasterIdLst>
-    <p:notesMasterId r:id="rId16"/>
+    <p:notesMasterId r:id="rId19"/>
   </p:notesMasterIdLst>
   <p:sldIdLst>
     <p:sldId id="304" r:id="rId2"/>
     <p:sldId id="257" r:id="rId3"/>
-    <p:sldId id="303" r:id="rId4"/>
+    <p:sldId id="344" r:id="rId4"/>
     <p:sldId id="259" r:id="rId5"/>
     <p:sldId id="260" r:id="rId6"/>
     <p:sldId id="305" r:id="rId7"/>
     <p:sldId id="306" r:id="rId8"/>
     <p:sldId id="271" r:id="rId9"/>
     <p:sldId id="275" r:id="rId10"/>
-    <p:sldId id="278" r:id="rId11"/>
-    <p:sldId id="282" r:id="rId12"/>
-    <p:sldId id="284" r:id="rId13"/>
-    <p:sldId id="287" r:id="rId14"/>
-    <p:sldId id="343" r:id="rId15"/>
+    <p:sldId id="346" r:id="rId11"/>
+    <p:sldId id="347" r:id="rId12"/>
+    <p:sldId id="348" r:id="rId13"/>
+    <p:sldId id="278" r:id="rId14"/>
+    <p:sldId id="282" r:id="rId15"/>
+    <p:sldId id="284" r:id="rId16"/>
+    <p:sldId id="287" r:id="rId17"/>
+    <p:sldId id="343" r:id="rId18"/>
   </p:sldIdLst>
   <p:sldSz cx="4610100" cy="3460750"/>
   <p:notesSz cx="4610100" cy="3460750"/>
@@ -221,7 +224,7 @@
           <a:p>
             <a:fld id="{8029FFF4-1735-2D4F-B84F-F6C1BAB36A7E}" type="datetimeFigureOut">
               <a:rPr lang="en-US" smtClean="0"/>
-              <a:t>1/26/26</a:t>
+              <a:t>1/27/26</a:t>
             </a:fld>
             <a:endParaRPr lang="en-US"/>
           </a:p>
@@ -490,90 +493,6 @@
 </file>
 
 <file path=ppt/notesSlides/notesSlide1.xml><?xml version="1.0" encoding="utf-8"?>
-<p:notes xmlns:a="http://schemas.openxmlformats.org/drawingml/2006/main" xmlns:r="http://schemas.openxmlformats.org/officeDocument/2006/relationships" xmlns:p="http://schemas.openxmlformats.org/presentationml/2006/main">
-  <p:cSld>
-    <p:spTree>
-      <p:nvGrpSpPr>
-        <p:cNvPr id="1" name=""/>
-        <p:cNvGrpSpPr/>
-        <p:nvPr/>
-      </p:nvGrpSpPr>
-      <p:grpSpPr>
-        <a:xfrm>
-          <a:off x="0" y="0"/>
-          <a:ext cx="0" cy="0"/>
-          <a:chOff x="0" y="0"/>
-          <a:chExt cx="0" cy="0"/>
-        </a:xfrm>
-      </p:grpSpPr>
-      <p:sp>
-        <p:nvSpPr>
-          <p:cNvPr id="2" name="Slide Image Placeholder 1"/>
-          <p:cNvSpPr>
-            <a:spLocks noGrp="1" noRot="1" noChangeAspect="1"/>
-          </p:cNvSpPr>
-          <p:nvPr>
-            <p:ph type="sldImg"/>
-          </p:nvPr>
-        </p:nvSpPr>
-        <p:spPr/>
-      </p:sp>
-      <p:sp>
-        <p:nvSpPr>
-          <p:cNvPr id="3" name="Notes Placeholder 2"/>
-          <p:cNvSpPr>
-            <a:spLocks noGrp="1"/>
-          </p:cNvSpPr>
-          <p:nvPr>
-            <p:ph type="body" idx="1"/>
-          </p:nvPr>
-        </p:nvSpPr>
-        <p:spPr/>
-        <p:txBody>
-          <a:bodyPr/>
-          <a:lstStyle/>
-          <a:p>
-            <a:endParaRPr lang="en-US" dirty="0"/>
-          </a:p>
-        </p:txBody>
-      </p:sp>
-      <p:sp>
-        <p:nvSpPr>
-          <p:cNvPr id="4" name="Slide Number Placeholder 3"/>
-          <p:cNvSpPr>
-            <a:spLocks noGrp="1"/>
-          </p:cNvSpPr>
-          <p:nvPr>
-            <p:ph type="sldNum" sz="quarter" idx="5"/>
-          </p:nvPr>
-        </p:nvSpPr>
-        <p:spPr/>
-        <p:txBody>
-          <a:bodyPr/>
-          <a:lstStyle/>
-          <a:p>
-            <a:fld id="{B70AB8EE-0D64-164D-A882-88332F28D619}" type="slidenum">
-              <a:rPr lang="en-US" smtClean="0"/>
-              <a:t>3</a:t>
-            </a:fld>
-            <a:endParaRPr lang="en-US"/>
-          </a:p>
-        </p:txBody>
-      </p:sp>
-    </p:spTree>
-    <p:extLst>
-      <p:ext uri="{BB962C8B-B14F-4D97-AF65-F5344CB8AC3E}">
-        <p14:creationId xmlns:p14="http://schemas.microsoft.com/office/powerpoint/2010/main" val="4208096854"/>
-      </p:ext>
-    </p:extLst>
-  </p:cSld>
-  <p:clrMapOvr>
-    <a:masterClrMapping/>
-  </p:clrMapOvr>
-</p:notes>
-</file>
-
-<file path=ppt/notesSlides/notesSlide2.xml><?xml version="1.0" encoding="utf-8"?>
 <p:notes xmlns:a="http://schemas.openxmlformats.org/drawingml/2006/main" xmlns:r="http://schemas.openxmlformats.org/officeDocument/2006/relationships" xmlns:p="http://schemas.openxmlformats.org/presentationml/2006/main">
   <p:cSld>
     <p:spTree>
@@ -942,7 +861,7 @@
           <a:p>
             <a:fld id="{1D8BD707-D9CF-40AE-B4C6-C98DA3205C09}" type="datetimeFigureOut">
               <a:rPr lang="en-US" smtClean="0"/>
-              <a:t>1/26/26</a:t>
+              <a:t>1/27/26</a:t>
             </a:fld>
             <a:endParaRPr lang="en-US"/>
           </a:p>
@@ -1374,7 +1293,7 @@
           <a:p>
             <a:fld id="{1D8BD707-D9CF-40AE-B4C6-C98DA3205C09}" type="datetimeFigureOut">
               <a:rPr lang="en-US" smtClean="0"/>
-              <a:t>1/26/26</a:t>
+              <a:t>1/27/26</a:t>
             </a:fld>
             <a:endParaRPr lang="en-US"/>
           </a:p>
@@ -1723,7 +1642,7 @@
           <a:p>
             <a:fld id="{1D8BD707-D9CF-40AE-B4C6-C98DA3205C09}" type="datetimeFigureOut">
               <a:rPr lang="en-US" smtClean="0"/>
-              <a:t>1/26/26</a:t>
+              <a:t>1/27/26</a:t>
             </a:fld>
             <a:endParaRPr lang="en-US"/>
           </a:p>
@@ -2141,7 +2060,7 @@
           <a:p>
             <a:fld id="{1D8BD707-D9CF-40AE-B4C6-C98DA3205C09}" type="datetimeFigureOut">
               <a:rPr lang="en-US" smtClean="0"/>
-              <a:t>1/26/26</a:t>
+              <a:t>1/27/26</a:t>
             </a:fld>
             <a:endParaRPr lang="en-US"/>
           </a:p>
@@ -2722,7 +2641,7 @@
           <a:p>
             <a:fld id="{1D8BD707-D9CF-40AE-B4C6-C98DA3205C09}" type="datetimeFigureOut">
               <a:rPr lang="en-US" smtClean="0"/>
-              <a:t>1/26/26</a:t>
+              <a:t>1/27/26</a:t>
             </a:fld>
             <a:endParaRPr lang="en-US"/>
           </a:p>
@@ -3416,7 +3335,7 @@
           <a:p>
             <a:fld id="{1D8BD707-D9CF-40AE-B4C6-C98DA3205C09}" type="datetimeFigureOut">
               <a:rPr lang="en-US" smtClean="0"/>
-              <a:t>1/26/26</a:t>
+              <a:t>1/27/26</a:t>
             </a:fld>
             <a:endParaRPr lang="en-US"/>
           </a:p>
@@ -4342,7 +4261,7 @@
           <a:p>
             <a:fld id="{1D8BD707-D9CF-40AE-B4C6-C98DA3205C09}" type="datetimeFigureOut">
               <a:rPr lang="en-US" smtClean="0"/>
-              <a:t>1/26/26</a:t>
+              <a:t>1/27/26</a:t>
             </a:fld>
             <a:endParaRPr lang="en-US"/>
           </a:p>
@@ -4673,7 +4592,7 @@
           <a:p>
             <a:fld id="{1D8BD707-D9CF-40AE-B4C6-C98DA3205C09}" type="datetimeFigureOut">
               <a:rPr lang="en-US" smtClean="0"/>
-              <a:t>1/26/26</a:t>
+              <a:t>1/27/26</a:t>
             </a:fld>
             <a:endParaRPr lang="en-US"/>
           </a:p>
@@ -4952,7 +4871,7 @@
           <a:p>
             <a:fld id="{1D8BD707-D9CF-40AE-B4C6-C98DA3205C09}" type="datetimeFigureOut">
               <a:rPr lang="en-US" smtClean="0"/>
-              <a:t>1/26/26</a:t>
+              <a:t>1/27/26</a:t>
             </a:fld>
             <a:endParaRPr lang="en-US"/>
           </a:p>
@@ -5178,7 +5097,7 @@
           <a:p>
             <a:fld id="{1D8BD707-D9CF-40AE-B4C6-C98DA3205C09}" type="datetimeFigureOut">
               <a:rPr lang="en-US"/>
-              <a:t>1/26/26</a:t>
+              <a:t>1/27/26</a:t>
             </a:fld>
             <a:endParaRPr lang="en-US"/>
           </a:p>
@@ -5504,7 +5423,7 @@
           <a:p>
             <a:fld id="{1D8BD707-D9CF-40AE-B4C6-C98DA3205C09}" type="datetimeFigureOut">
               <a:rPr lang="en-US" smtClean="0"/>
-              <a:t>1/26/26</a:t>
+              <a:t>1/27/26</a:t>
             </a:fld>
             <a:endParaRPr lang="en-US"/>
           </a:p>
@@ -5911,7 +5830,7 @@
           <a:p>
             <a:fld id="{1D8BD707-D9CF-40AE-B4C6-C98DA3205C09}" type="datetimeFigureOut">
               <a:rPr lang="en-US" smtClean="0"/>
-              <a:t>1/26/26</a:t>
+              <a:t>1/27/26</a:t>
             </a:fld>
             <a:endParaRPr lang="en-US"/>
           </a:p>
@@ -6310,7 +6229,7 @@
           <a:p>
             <a:fld id="{1D8BD707-D9CF-40AE-B4C6-C98DA3205C09}" type="datetimeFigureOut">
               <a:rPr lang="en-US" smtClean="0"/>
-              <a:t>1/26/26</a:t>
+              <a:t>1/27/26</a:t>
             </a:fld>
             <a:endParaRPr lang="en-US"/>
           </a:p>
@@ -6829,7 +6748,7 @@
           <a:p>
             <a:fld id="{1D8BD707-D9CF-40AE-B4C6-C98DA3205C09}" type="datetimeFigureOut">
               <a:rPr lang="en-US" smtClean="0"/>
-              <a:t>1/26/26</a:t>
+              <a:t>1/27/26</a:t>
             </a:fld>
             <a:endParaRPr lang="en-US"/>
           </a:p>
@@ -7113,7 +7032,7 @@
           <a:p>
             <a:fld id="{1D8BD707-D9CF-40AE-B4C6-C98DA3205C09}" type="datetimeFigureOut">
               <a:rPr lang="en-US" smtClean="0"/>
-              <a:t>1/26/26</a:t>
+              <a:t>1/27/26</a:t>
             </a:fld>
             <a:endParaRPr lang="en-US"/>
           </a:p>
@@ -7282,7 +7201,7 @@
           <a:p>
             <a:fld id="{1D8BD707-D9CF-40AE-B4C6-C98DA3205C09}" type="datetimeFigureOut">
               <a:rPr lang="en-US" smtClean="0"/>
-              <a:t>1/26/26</a:t>
+              <a:t>1/27/26</a:t>
             </a:fld>
             <a:endParaRPr lang="en-US"/>
           </a:p>
@@ -7685,7 +7604,7 @@
           <a:p>
             <a:fld id="{1D8BD707-D9CF-40AE-B4C6-C98DA3205C09}" type="datetimeFigureOut">
               <a:rPr lang="en-US" smtClean="0"/>
-              <a:t>1/26/26</a:t>
+              <a:t>1/27/26</a:t>
             </a:fld>
             <a:endParaRPr lang="en-US"/>
           </a:p>
@@ -8107,7 +8026,7 @@
           <a:p>
             <a:fld id="{1D8BD707-D9CF-40AE-B4C6-C98DA3205C09}" type="datetimeFigureOut">
               <a:rPr lang="en-US" smtClean="0"/>
-              <a:t>1/26/26</a:t>
+              <a:t>1/27/26</a:t>
             </a:fld>
             <a:endParaRPr lang="en-US"/>
           </a:p>
@@ -8222,7 +8141,7 @@
           </a:prstGeom>
           <a:extLst>
             <a:ext uri="{909E8E84-426E-40dd-AFC4-6F175D3DCCD1}">
-              <a14:hiddenFill xmlns:a14="http://schemas.microsoft.com/office/drawing/2010/main" xmlns="">
+              <a14:hiddenFill xmlns="" xmlns:a14="http://schemas.microsoft.com/office/drawing/2010/main">
                 <a:solidFill>
                   <a:srgbClr val="FFFFFF"/>
                 </a:solidFill>
@@ -8361,7 +8280,7 @@
           <a:p>
             <a:fld id="{1D8BD707-D9CF-40AE-B4C6-C98DA3205C09}" type="datetimeFigureOut">
               <a:rPr lang="en-US" smtClean="0"/>
-              <a:t>1/26/26</a:t>
+              <a:t>1/27/26</a:t>
             </a:fld>
             <a:endParaRPr lang="en-US"/>
           </a:p>
@@ -8794,7 +8713,7 @@
         </p:blipFill>
         <p:spPr>
           <a:xfrm>
-            <a:off x="230505" y="981234"/>
+            <a:off x="193642" y="1038860"/>
             <a:ext cx="4299847" cy="1383030"/>
           </a:xfrm>
           <a:prstGeom prst="rect">
@@ -8910,14 +8829,14 @@
           </a:xfrm>
           <a:extLst>
             <a:ext uri="{909E8E84-426E-40dd-AFC4-6F175D3DCCD1}">
-              <a14:hiddenFill xmlns="" xmlns:a14="http://schemas.microsoft.com/office/drawing/2010/main">
+              <a14:hiddenFill xmlns:a14="http://schemas.microsoft.com/office/drawing/2010/main" xmlns="">
                 <a:solidFill>
                   <a:srgbClr val="FFFFFF"/>
                 </a:solidFill>
               </a14:hiddenFill>
             </a:ext>
             <a:ext uri="{91240B29-F687-4f45-9708-019B960494DF}">
-              <a14:hiddenLine xmlns="" xmlns:a14="http://schemas.microsoft.com/office/drawing/2010/main" w="9525">
+              <a14:hiddenLine xmlns:a14="http://schemas.microsoft.com/office/drawing/2010/main" xmlns="" w="9525">
                 <a:solidFill>
                   <a:srgbClr val="000000"/>
                 </a:solidFill>
@@ -9091,6 +9010,1731 @@
       </p:grpSpPr>
       <p:sp>
         <p:nvSpPr>
+          <p:cNvPr id="2" name="Title 1">
+            <a:extLst>
+              <a:ext uri="{FF2B5EF4-FFF2-40B4-BE49-F238E27FC236}">
+                <a16:creationId xmlns:a16="http://schemas.microsoft.com/office/drawing/2014/main" id="{2864372D-1F4A-209C-68DB-CBD3408D1467}"/>
+              </a:ext>
+            </a:extLst>
+          </p:cNvPr>
+          <p:cNvSpPr>
+            <a:spLocks noGrp="1"/>
+          </p:cNvSpPr>
+          <p:nvPr>
+            <p:ph type="title"/>
+          </p:nvPr>
+        </p:nvSpPr>
+        <p:spPr/>
+        <p:txBody>
+          <a:bodyPr>
+            <a:normAutofit/>
+          </a:bodyPr>
+          <a:lstStyle/>
+          <a:p>
+            <a:r>
+              <a:rPr lang="en-US" sz="1800" b="1" dirty="0"/>
+              <a:t>if expression and lambdas</a:t>
+            </a:r>
+          </a:p>
+        </p:txBody>
+      </p:sp>
+      <p:sp>
+        <p:nvSpPr>
+          <p:cNvPr id="3" name="Content Placeholder 2">
+            <a:extLst>
+              <a:ext uri="{FF2B5EF4-FFF2-40B4-BE49-F238E27FC236}">
+                <a16:creationId xmlns:a16="http://schemas.microsoft.com/office/drawing/2014/main" id="{C30FE8E5-41D4-7A0F-A698-B75A5A1002E1}"/>
+              </a:ext>
+            </a:extLst>
+          </p:cNvPr>
+          <p:cNvSpPr>
+            <a:spLocks noGrp="1"/>
+          </p:cNvSpPr>
+          <p:nvPr>
+            <p:ph idx="1"/>
+          </p:nvPr>
+        </p:nvSpPr>
+        <p:spPr/>
+        <p:txBody>
+          <a:bodyPr/>
+          <a:lstStyle/>
+          <a:p>
+            <a:r>
+              <a:rPr lang="en-IE" sz="1400" dirty="0"/>
+              <a:t>In Haskell, </a:t>
+            </a:r>
+            <a:r>
+              <a:rPr lang="en-IE" sz="1400" b="1" dirty="0">
+                <a:solidFill>
+                  <a:srgbClr val="FF0000"/>
+                </a:solidFill>
+              </a:rPr>
+              <a:t>if</a:t>
+            </a:r>
+            <a:r>
+              <a:rPr lang="en-IE" sz="1400" dirty="0">
+                <a:solidFill>
+                  <a:srgbClr val="FF0000"/>
+                </a:solidFill>
+              </a:rPr>
+              <a:t> is an expression</a:t>
+            </a:r>
+            <a:r>
+              <a:rPr lang="en-IE" sz="1400" dirty="0"/>
+              <a:t>, not a statement.</a:t>
+            </a:r>
+          </a:p>
+          <a:p>
+            <a:pPr marL="0" indent="0">
+              <a:buNone/>
+            </a:pPr>
+            <a:endParaRPr lang="en-IE" sz="1400" dirty="0"/>
+          </a:p>
+          <a:p>
+            <a:r>
+              <a:rPr lang="en-IE" sz="1400" dirty="0"/>
+              <a:t>That means it can appear </a:t>
+            </a:r>
+            <a:r>
+              <a:rPr lang="en-IE" sz="1400" b="1" dirty="0"/>
+              <a:t>anywhere an expression is allowed</a:t>
+            </a:r>
+            <a:r>
+              <a:rPr lang="en-IE" sz="1400" dirty="0"/>
+              <a:t> — including inside a lambda.</a:t>
+            </a:r>
+          </a:p>
+          <a:p>
+            <a:pPr marL="0" indent="0">
+              <a:buNone/>
+            </a:pPr>
+            <a:endParaRPr lang="en-IE" dirty="0"/>
+          </a:p>
+          <a:p>
+            <a:endParaRPr lang="en-US" dirty="0"/>
+          </a:p>
+        </p:txBody>
+      </p:sp>
+      <p:sp>
+        <p:nvSpPr>
+          <p:cNvPr id="4" name="Slide Number Placeholder 2">
+            <a:extLst>
+              <a:ext uri="{FF2B5EF4-FFF2-40B4-BE49-F238E27FC236}">
+                <a16:creationId xmlns:a16="http://schemas.microsoft.com/office/drawing/2014/main" id="{37003F18-8AC1-6615-0EDF-706F3D66E323}"/>
+              </a:ext>
+            </a:extLst>
+          </p:cNvPr>
+          <p:cNvSpPr>
+            <a:spLocks noGrp="1"/>
+          </p:cNvSpPr>
+          <p:nvPr>
+            <p:ph type="sldNum" sz="quarter" idx="12"/>
+          </p:nvPr>
+        </p:nvSpPr>
+        <p:spPr>
+          <a:xfrm>
+            <a:off x="3957002" y="380102"/>
+            <a:ext cx="583661" cy="550444"/>
+          </a:xfrm>
+          <a:extLst>
+            <a:ext uri="{909E8E84-426E-40dd-AFC4-6F175D3DCCD1}">
+              <a14:hiddenFill xmlns:a14="http://schemas.microsoft.com/office/drawing/2010/main" xmlns="">
+                <a:solidFill>
+                  <a:srgbClr val="FFFFFF"/>
+                </a:solidFill>
+              </a14:hiddenFill>
+            </a:ext>
+            <a:ext uri="{91240B29-F687-4f45-9708-019B960494DF}">
+              <a14:hiddenLine xmlns:a14="http://schemas.microsoft.com/office/drawing/2010/main" xmlns="" w="9525">
+                <a:solidFill>
+                  <a:srgbClr val="000000"/>
+                </a:solidFill>
+                <a:miter lim="800000"/>
+                <a:headEnd/>
+                <a:tailEnd/>
+              </a14:hiddenLine>
+            </a:ext>
+          </a:extLst>
+        </p:spPr>
+        <p:txBody>
+          <a:bodyPr wrap="square" anchor="t">
+            <a:normAutofit/>
+          </a:bodyPr>
+          <a:lstStyle>
+            <a:lvl1pPr>
+              <a:defRPr sz="1412">
+                <a:solidFill>
+                  <a:schemeClr val="tx1"/>
+                </a:solidFill>
+                <a:latin typeface="Tahoma" charset="0"/>
+                <a:ea typeface="ＭＳ Ｐゴシック" charset="0"/>
+                <a:cs typeface="ＭＳ Ｐゴシック" charset="0"/>
+              </a:defRPr>
+            </a:lvl1pPr>
+            <a:lvl2pPr marL="374595" indent="-144075">
+              <a:defRPr sz="1412">
+                <a:solidFill>
+                  <a:schemeClr val="tx1"/>
+                </a:solidFill>
+                <a:latin typeface="Tahoma" charset="0"/>
+                <a:ea typeface="ＭＳ Ｐゴシック" charset="0"/>
+              </a:defRPr>
+            </a:lvl2pPr>
+            <a:lvl3pPr marL="576301" indent="-115260">
+              <a:defRPr sz="1412">
+                <a:solidFill>
+                  <a:schemeClr val="tx1"/>
+                </a:solidFill>
+                <a:latin typeface="Tahoma" charset="0"/>
+                <a:ea typeface="ＭＳ Ｐゴシック" charset="0"/>
+              </a:defRPr>
+            </a:lvl3pPr>
+            <a:lvl4pPr marL="806821" indent="-115260">
+              <a:defRPr sz="1412">
+                <a:solidFill>
+                  <a:schemeClr val="tx1"/>
+                </a:solidFill>
+                <a:latin typeface="Tahoma" charset="0"/>
+                <a:ea typeface="ＭＳ Ｐゴシック" charset="0"/>
+              </a:defRPr>
+            </a:lvl4pPr>
+            <a:lvl5pPr marL="1037341" indent="-115260">
+              <a:defRPr sz="1412">
+                <a:solidFill>
+                  <a:schemeClr val="tx1"/>
+                </a:solidFill>
+                <a:latin typeface="Tahoma" charset="0"/>
+                <a:ea typeface="ＭＳ Ｐゴシック" charset="0"/>
+              </a:defRPr>
+            </a:lvl5pPr>
+            <a:lvl6pPr marL="1267861" indent="-115260" eaLnBrk="0" fontAlgn="base" hangingPunct="0">
+              <a:spcBef>
+                <a:spcPct val="0"/>
+              </a:spcBef>
+              <a:spcAft>
+                <a:spcPct val="0"/>
+              </a:spcAft>
+              <a:defRPr sz="1412">
+                <a:solidFill>
+                  <a:schemeClr val="tx1"/>
+                </a:solidFill>
+                <a:latin typeface="Tahoma" charset="0"/>
+                <a:ea typeface="ＭＳ Ｐゴシック" charset="0"/>
+              </a:defRPr>
+            </a:lvl6pPr>
+            <a:lvl7pPr marL="1498382" indent="-115260" eaLnBrk="0" fontAlgn="base" hangingPunct="0">
+              <a:spcBef>
+                <a:spcPct val="0"/>
+              </a:spcBef>
+              <a:spcAft>
+                <a:spcPct val="0"/>
+              </a:spcAft>
+              <a:defRPr sz="1412">
+                <a:solidFill>
+                  <a:schemeClr val="tx1"/>
+                </a:solidFill>
+                <a:latin typeface="Tahoma" charset="0"/>
+                <a:ea typeface="ＭＳ Ｐゴシック" charset="0"/>
+              </a:defRPr>
+            </a:lvl7pPr>
+            <a:lvl8pPr marL="1728902" indent="-115260" eaLnBrk="0" fontAlgn="base" hangingPunct="0">
+              <a:spcBef>
+                <a:spcPct val="0"/>
+              </a:spcBef>
+              <a:spcAft>
+                <a:spcPct val="0"/>
+              </a:spcAft>
+              <a:defRPr sz="1412">
+                <a:solidFill>
+                  <a:schemeClr val="tx1"/>
+                </a:solidFill>
+                <a:latin typeface="Tahoma" charset="0"/>
+                <a:ea typeface="ＭＳ Ｐゴシック" charset="0"/>
+              </a:defRPr>
+            </a:lvl8pPr>
+            <a:lvl9pPr marL="1959422" indent="-115260" eaLnBrk="0" fontAlgn="base" hangingPunct="0">
+              <a:spcBef>
+                <a:spcPct val="0"/>
+              </a:spcBef>
+              <a:spcAft>
+                <a:spcPct val="0"/>
+              </a:spcAft>
+              <a:defRPr sz="1412">
+                <a:solidFill>
+                  <a:schemeClr val="tx1"/>
+                </a:solidFill>
+                <a:latin typeface="Tahoma" charset="0"/>
+                <a:ea typeface="ＭＳ Ｐゴシック" charset="0"/>
+              </a:defRPr>
+            </a:lvl9pPr>
+          </a:lstStyle>
+          <a:p>
+            <a:pPr>
+              <a:spcAft>
+                <a:spcPts val="303"/>
+              </a:spcAft>
+            </a:pPr>
+            <a:fld id="{CC73A6B6-49ED-C641-8D95-0A84FA800C15}" type="slidenum">
+              <a:rPr lang="en-US" sz="706"/>
+              <a:pPr>
+                <a:spcAft>
+                  <a:spcPts val="303"/>
+                </a:spcAft>
+              </a:pPr>
+              <a:t>10</a:t>
+            </a:fld>
+            <a:endParaRPr lang="en-US" sz="706" dirty="0"/>
+          </a:p>
+        </p:txBody>
+      </p:sp>
+    </p:spTree>
+    <p:extLst>
+      <p:ext uri="{BB962C8B-B14F-4D97-AF65-F5344CB8AC3E}">
+        <p14:creationId xmlns:p14="http://schemas.microsoft.com/office/powerpoint/2010/main" val="1371213711"/>
+      </p:ext>
+    </p:extLst>
+  </p:cSld>
+  <p:clrMapOvr>
+    <a:masterClrMapping/>
+  </p:clrMapOvr>
+  <p:timing>
+    <p:tnLst>
+      <p:par>
+        <p:cTn id="1" dur="indefinite" restart="never" nodeType="tmRoot">
+          <p:childTnLst>
+            <p:seq concurrent="1" nextAc="seek">
+              <p:cTn id="2" dur="indefinite" nodeType="mainSeq">
+                <p:childTnLst>
+                  <p:par>
+                    <p:cTn id="3" fill="hold">
+                      <p:stCondLst>
+                        <p:cond delay="indefinite"/>
+                      </p:stCondLst>
+                      <p:childTnLst>
+                        <p:par>
+                          <p:cTn id="4" fill="hold">
+                            <p:stCondLst>
+                              <p:cond delay="0"/>
+                            </p:stCondLst>
+                            <p:childTnLst>
+                              <p:par>
+                                <p:cTn id="5" presetID="2" presetClass="entr" presetSubtype="4" fill="hold" nodeType="clickEffect">
+                                  <p:stCondLst>
+                                    <p:cond delay="0"/>
+                                  </p:stCondLst>
+                                  <p:childTnLst>
+                                    <p:set>
+                                      <p:cBhvr>
+                                        <p:cTn id="6" dur="1" fill="hold">
+                                          <p:stCondLst>
+                                            <p:cond delay="0"/>
+                                          </p:stCondLst>
+                                        </p:cTn>
+                                        <p:tgtEl>
+                                          <p:spTgt spid="3">
+                                            <p:txEl>
+                                              <p:pRg st="0" end="0"/>
+                                            </p:txEl>
+                                          </p:spTgt>
+                                        </p:tgtEl>
+                                        <p:attrNameLst>
+                                          <p:attrName>style.visibility</p:attrName>
+                                        </p:attrNameLst>
+                                      </p:cBhvr>
+                                      <p:to>
+                                        <p:strVal val="visible"/>
+                                      </p:to>
+                                    </p:set>
+                                    <p:anim calcmode="lin" valueType="num">
+                                      <p:cBhvr additive="base">
+                                        <p:cTn id="7" dur="500" fill="hold"/>
+                                        <p:tgtEl>
+                                          <p:spTgt spid="3">
+                                            <p:txEl>
+                                              <p:pRg st="0" end="0"/>
+                                            </p:txEl>
+                                          </p:spTgt>
+                                        </p:tgtEl>
+                                        <p:attrNameLst>
+                                          <p:attrName>ppt_x</p:attrName>
+                                        </p:attrNameLst>
+                                      </p:cBhvr>
+                                      <p:tavLst>
+                                        <p:tav tm="0">
+                                          <p:val>
+                                            <p:strVal val="#ppt_x"/>
+                                          </p:val>
+                                        </p:tav>
+                                        <p:tav tm="100000">
+                                          <p:val>
+                                            <p:strVal val="#ppt_x"/>
+                                          </p:val>
+                                        </p:tav>
+                                      </p:tavLst>
+                                    </p:anim>
+                                    <p:anim calcmode="lin" valueType="num">
+                                      <p:cBhvr additive="base">
+                                        <p:cTn id="8" dur="500" fill="hold"/>
+                                        <p:tgtEl>
+                                          <p:spTgt spid="3">
+                                            <p:txEl>
+                                              <p:pRg st="0" end="0"/>
+                                            </p:txEl>
+                                          </p:spTgt>
+                                        </p:tgtEl>
+                                        <p:attrNameLst>
+                                          <p:attrName>ppt_y</p:attrName>
+                                        </p:attrNameLst>
+                                      </p:cBhvr>
+                                      <p:tavLst>
+                                        <p:tav tm="0">
+                                          <p:val>
+                                            <p:strVal val="1+#ppt_h/2"/>
+                                          </p:val>
+                                        </p:tav>
+                                        <p:tav tm="100000">
+                                          <p:val>
+                                            <p:strVal val="#ppt_y"/>
+                                          </p:val>
+                                        </p:tav>
+                                      </p:tavLst>
+                                    </p:anim>
+                                  </p:childTnLst>
+                                </p:cTn>
+                              </p:par>
+                            </p:childTnLst>
+                          </p:cTn>
+                        </p:par>
+                      </p:childTnLst>
+                    </p:cTn>
+                  </p:par>
+                  <p:par>
+                    <p:cTn id="9" fill="hold">
+                      <p:stCondLst>
+                        <p:cond delay="indefinite"/>
+                      </p:stCondLst>
+                      <p:childTnLst>
+                        <p:par>
+                          <p:cTn id="10" fill="hold">
+                            <p:stCondLst>
+                              <p:cond delay="0"/>
+                            </p:stCondLst>
+                            <p:childTnLst>
+                              <p:par>
+                                <p:cTn id="11" presetID="2" presetClass="entr" presetSubtype="4" fill="hold" nodeType="clickEffect">
+                                  <p:stCondLst>
+                                    <p:cond delay="0"/>
+                                  </p:stCondLst>
+                                  <p:childTnLst>
+                                    <p:set>
+                                      <p:cBhvr>
+                                        <p:cTn id="12" dur="1" fill="hold">
+                                          <p:stCondLst>
+                                            <p:cond delay="0"/>
+                                          </p:stCondLst>
+                                        </p:cTn>
+                                        <p:tgtEl>
+                                          <p:spTgt spid="3">
+                                            <p:txEl>
+                                              <p:pRg st="2" end="2"/>
+                                            </p:txEl>
+                                          </p:spTgt>
+                                        </p:tgtEl>
+                                        <p:attrNameLst>
+                                          <p:attrName>style.visibility</p:attrName>
+                                        </p:attrNameLst>
+                                      </p:cBhvr>
+                                      <p:to>
+                                        <p:strVal val="visible"/>
+                                      </p:to>
+                                    </p:set>
+                                    <p:anim calcmode="lin" valueType="num">
+                                      <p:cBhvr additive="base">
+                                        <p:cTn id="13" dur="500" fill="hold"/>
+                                        <p:tgtEl>
+                                          <p:spTgt spid="3">
+                                            <p:txEl>
+                                              <p:pRg st="2" end="2"/>
+                                            </p:txEl>
+                                          </p:spTgt>
+                                        </p:tgtEl>
+                                        <p:attrNameLst>
+                                          <p:attrName>ppt_x</p:attrName>
+                                        </p:attrNameLst>
+                                      </p:cBhvr>
+                                      <p:tavLst>
+                                        <p:tav tm="0">
+                                          <p:val>
+                                            <p:strVal val="#ppt_x"/>
+                                          </p:val>
+                                        </p:tav>
+                                        <p:tav tm="100000">
+                                          <p:val>
+                                            <p:strVal val="#ppt_x"/>
+                                          </p:val>
+                                        </p:tav>
+                                      </p:tavLst>
+                                    </p:anim>
+                                    <p:anim calcmode="lin" valueType="num">
+                                      <p:cBhvr additive="base">
+                                        <p:cTn id="14" dur="500" fill="hold"/>
+                                        <p:tgtEl>
+                                          <p:spTgt spid="3">
+                                            <p:txEl>
+                                              <p:pRg st="2" end="2"/>
+                                            </p:txEl>
+                                          </p:spTgt>
+                                        </p:tgtEl>
+                                        <p:attrNameLst>
+                                          <p:attrName>ppt_y</p:attrName>
+                                        </p:attrNameLst>
+                                      </p:cBhvr>
+                                      <p:tavLst>
+                                        <p:tav tm="0">
+                                          <p:val>
+                                            <p:strVal val="1+#ppt_h/2"/>
+                                          </p:val>
+                                        </p:tav>
+                                        <p:tav tm="100000">
+                                          <p:val>
+                                            <p:strVal val="#ppt_y"/>
+                                          </p:val>
+                                        </p:tav>
+                                      </p:tavLst>
+                                    </p:anim>
+                                  </p:childTnLst>
+                                </p:cTn>
+                              </p:par>
+                            </p:childTnLst>
+                          </p:cTn>
+                        </p:par>
+                      </p:childTnLst>
+                    </p:cTn>
+                  </p:par>
+                </p:childTnLst>
+              </p:cTn>
+              <p:prevCondLst>
+                <p:cond evt="onPrev" delay="0">
+                  <p:tgtEl>
+                    <p:sldTgt/>
+                  </p:tgtEl>
+                </p:cond>
+              </p:prevCondLst>
+              <p:nextCondLst>
+                <p:cond evt="onNext" delay="0">
+                  <p:tgtEl>
+                    <p:sldTgt/>
+                  </p:tgtEl>
+                </p:cond>
+              </p:nextCondLst>
+            </p:seq>
+          </p:childTnLst>
+        </p:cTn>
+      </p:par>
+    </p:tnLst>
+  </p:timing>
+</p:sld>
+</file>
+
+<file path=ppt/slides/slide11.xml><?xml version="1.0" encoding="utf-8"?>
+<p:sld xmlns:a="http://schemas.openxmlformats.org/drawingml/2006/main" xmlns:r="http://schemas.openxmlformats.org/officeDocument/2006/relationships" xmlns:p="http://schemas.openxmlformats.org/presentationml/2006/main">
+  <p:cSld>
+    <p:spTree>
+      <p:nvGrpSpPr>
+        <p:cNvPr id="1" name=""/>
+        <p:cNvGrpSpPr/>
+        <p:nvPr/>
+      </p:nvGrpSpPr>
+      <p:grpSpPr>
+        <a:xfrm>
+          <a:off x="0" y="0"/>
+          <a:ext cx="0" cy="0"/>
+          <a:chOff x="0" y="0"/>
+          <a:chExt cx="0" cy="0"/>
+        </a:xfrm>
+      </p:grpSpPr>
+      <p:sp>
+        <p:nvSpPr>
+          <p:cNvPr id="2" name="Title 1">
+            <a:extLst>
+              <a:ext uri="{FF2B5EF4-FFF2-40B4-BE49-F238E27FC236}">
+                <a16:creationId xmlns:a16="http://schemas.microsoft.com/office/drawing/2014/main" id="{B46FEB3B-0EB1-84C6-FCDE-E1E0BB6183F6}"/>
+              </a:ext>
+            </a:extLst>
+          </p:cNvPr>
+          <p:cNvSpPr>
+            <a:spLocks noGrp="1"/>
+          </p:cNvSpPr>
+          <p:nvPr>
+            <p:ph type="title"/>
+          </p:nvPr>
+        </p:nvSpPr>
+        <p:spPr/>
+        <p:txBody>
+          <a:bodyPr/>
+          <a:lstStyle/>
+          <a:p>
+            <a:r>
+              <a:rPr lang="en-US" sz="2000" b="1" dirty="0"/>
+              <a:t>if expression and lambdas</a:t>
+            </a:r>
+            <a:endParaRPr lang="en-US" dirty="0"/>
+          </a:p>
+        </p:txBody>
+      </p:sp>
+      <p:sp>
+        <p:nvSpPr>
+          <p:cNvPr id="4" name="Text Box 9">
+            <a:extLst>
+              <a:ext uri="{FF2B5EF4-FFF2-40B4-BE49-F238E27FC236}">
+                <a16:creationId xmlns:a16="http://schemas.microsoft.com/office/drawing/2014/main" id="{D2451261-021B-152E-5F8E-F45872955F4D}"/>
+              </a:ext>
+            </a:extLst>
+          </p:cNvPr>
+          <p:cNvSpPr txBox="1">
+            <a:spLocks noChangeArrowheads="1"/>
+          </p:cNvSpPr>
+          <p:nvPr/>
+        </p:nvSpPr>
+        <p:spPr bwMode="auto">
+          <a:xfrm>
+            <a:off x="273832" y="1120775"/>
+            <a:ext cx="1752600" cy="738664"/>
+          </a:xfrm>
+          <a:prstGeom prst="rect">
+            <a:avLst/>
+          </a:prstGeom>
+          <a:solidFill>
+            <a:schemeClr val="accent1"/>
+          </a:solidFill>
+          <a:ln>
+            <a:solidFill>
+              <a:schemeClr val="accent1">
+                <a:shade val="15000"/>
+              </a:schemeClr>
+            </a:solidFill>
+          </a:ln>
+          <a:effectLst/>
+        </p:spPr>
+        <p:txBody>
+          <a:bodyPr wrap="square" anchor="ctr">
+            <a:spAutoFit/>
+          </a:bodyPr>
+          <a:lstStyle/>
+          <a:p>
+            <a:r>
+              <a:rPr lang="en-IE" sz="1400" dirty="0"/>
+              <a:t>\x -&gt; \y -&gt;</a:t>
+            </a:r>
+          </a:p>
+          <a:p>
+            <a:r>
+              <a:rPr lang="en-IE" sz="1400" dirty="0"/>
+              <a:t>  if x &lt; y then -1</a:t>
+            </a:r>
+          </a:p>
+          <a:p>
+            <a:r>
+              <a:rPr lang="en-IE" sz="1400" dirty="0"/>
+              <a:t>  else 1</a:t>
+            </a:r>
+          </a:p>
+        </p:txBody>
+      </p:sp>
+      <p:sp>
+        <p:nvSpPr>
+          <p:cNvPr id="7" name="Text Box 9">
+            <a:extLst>
+              <a:ext uri="{FF2B5EF4-FFF2-40B4-BE49-F238E27FC236}">
+                <a16:creationId xmlns:a16="http://schemas.microsoft.com/office/drawing/2014/main" id="{B3851283-D0FF-9EAC-CCDA-0D2B5AAF0323}"/>
+              </a:ext>
+            </a:extLst>
+          </p:cNvPr>
+          <p:cNvSpPr txBox="1">
+            <a:spLocks noChangeArrowheads="1"/>
+          </p:cNvSpPr>
+          <p:nvPr/>
+        </p:nvSpPr>
+        <p:spPr bwMode="auto">
+          <a:xfrm>
+            <a:off x="277145" y="2345966"/>
+            <a:ext cx="2869418" cy="523220"/>
+          </a:xfrm>
+          <a:prstGeom prst="rect">
+            <a:avLst/>
+          </a:prstGeom>
+          <a:solidFill>
+            <a:schemeClr val="accent1"/>
+          </a:solidFill>
+          <a:ln>
+            <a:solidFill>
+              <a:schemeClr val="accent1">
+                <a:shade val="15000"/>
+              </a:schemeClr>
+            </a:solidFill>
+          </a:ln>
+          <a:effectLst/>
+        </p:spPr>
+        <p:txBody>
+          <a:bodyPr wrap="square" anchor="ctr">
+            <a:spAutoFit/>
+          </a:bodyPr>
+          <a:lstStyle/>
+          <a:p>
+            <a:r>
+              <a:rPr lang="en-US" sz="1400" dirty="0"/>
+              <a:t>(\x y -&gt; if x &lt; y then -1 else 1) 3 4</a:t>
+            </a:r>
+          </a:p>
+          <a:p>
+            <a:r>
+              <a:rPr lang="en-US" sz="1400" dirty="0"/>
+              <a:t>-1</a:t>
+            </a:r>
+          </a:p>
+        </p:txBody>
+      </p:sp>
+      <p:sp>
+        <p:nvSpPr>
+          <p:cNvPr id="8" name="Rectangular Callout 7">
+            <a:extLst>
+              <a:ext uri="{FF2B5EF4-FFF2-40B4-BE49-F238E27FC236}">
+                <a16:creationId xmlns:a16="http://schemas.microsoft.com/office/drawing/2014/main" id="{A3B6A080-9179-CAF3-6721-9BEAF2CA0C4E}"/>
+              </a:ext>
+            </a:extLst>
+          </p:cNvPr>
+          <p:cNvSpPr/>
+          <p:nvPr/>
+        </p:nvSpPr>
+        <p:spPr>
+          <a:xfrm>
+            <a:off x="2457450" y="1161852"/>
+            <a:ext cx="1600200" cy="545473"/>
+          </a:xfrm>
+          <a:prstGeom prst="wedgeRectCallout">
+            <a:avLst>
+              <a:gd name="adj1" fmla="val -85861"/>
+              <a:gd name="adj2" fmla="val -6275"/>
+            </a:avLst>
+          </a:prstGeom>
+          <a:solidFill>
+            <a:schemeClr val="accent4"/>
+          </a:solidFill>
+        </p:spPr>
+        <p:style>
+          <a:lnRef idx="2">
+            <a:schemeClr val="accent1">
+              <a:shade val="15000"/>
+            </a:schemeClr>
+          </a:lnRef>
+          <a:fillRef idx="1">
+            <a:schemeClr val="accent1"/>
+          </a:fillRef>
+          <a:effectRef idx="0">
+            <a:schemeClr val="accent1"/>
+          </a:effectRef>
+          <a:fontRef idx="minor">
+            <a:schemeClr val="lt1"/>
+          </a:fontRef>
+        </p:style>
+        <p:txBody>
+          <a:bodyPr rtlCol="0" anchor="ctr"/>
+          <a:lstStyle/>
+          <a:p>
+            <a:pPr algn="ctr"/>
+            <a:r>
+              <a:rPr lang="en-US" sz="1400" dirty="0"/>
+              <a:t>Definition of function</a:t>
+            </a:r>
+          </a:p>
+        </p:txBody>
+      </p:sp>
+      <p:sp>
+        <p:nvSpPr>
+          <p:cNvPr id="9" name="Rectangular Callout 8">
+            <a:extLst>
+              <a:ext uri="{FF2B5EF4-FFF2-40B4-BE49-F238E27FC236}">
+                <a16:creationId xmlns:a16="http://schemas.microsoft.com/office/drawing/2014/main" id="{88E651AF-6A4E-3822-B0CA-0436AFC94222}"/>
+              </a:ext>
+            </a:extLst>
+          </p:cNvPr>
+          <p:cNvSpPr/>
+          <p:nvPr/>
+        </p:nvSpPr>
+        <p:spPr>
+          <a:xfrm>
+            <a:off x="2944937" y="1753426"/>
+            <a:ext cx="1600200" cy="545473"/>
+          </a:xfrm>
+          <a:prstGeom prst="wedgeRectCallout">
+            <a:avLst>
+              <a:gd name="adj1" fmla="val -90002"/>
+              <a:gd name="adj2" fmla="val 53247"/>
+            </a:avLst>
+          </a:prstGeom>
+          <a:solidFill>
+            <a:schemeClr val="accent4"/>
+          </a:solidFill>
+        </p:spPr>
+        <p:style>
+          <a:lnRef idx="2">
+            <a:schemeClr val="accent1">
+              <a:shade val="15000"/>
+            </a:schemeClr>
+          </a:lnRef>
+          <a:fillRef idx="1">
+            <a:schemeClr val="accent1"/>
+          </a:fillRef>
+          <a:effectRef idx="0">
+            <a:schemeClr val="accent1"/>
+          </a:effectRef>
+          <a:fontRef idx="minor">
+            <a:schemeClr val="lt1"/>
+          </a:fontRef>
+        </p:style>
+        <p:txBody>
+          <a:bodyPr rtlCol="0" anchor="ctr"/>
+          <a:lstStyle/>
+          <a:p>
+            <a:pPr algn="ctr"/>
+            <a:r>
+              <a:rPr lang="en-US" sz="1400" dirty="0"/>
+              <a:t>Application of function</a:t>
+            </a:r>
+          </a:p>
+        </p:txBody>
+      </p:sp>
+      <p:sp>
+        <p:nvSpPr>
+          <p:cNvPr id="10" name="Slide Number Placeholder 2">
+            <a:extLst>
+              <a:ext uri="{FF2B5EF4-FFF2-40B4-BE49-F238E27FC236}">
+                <a16:creationId xmlns:a16="http://schemas.microsoft.com/office/drawing/2014/main" id="{11508B09-247B-B748-25C1-FA4F378DBD6F}"/>
+              </a:ext>
+            </a:extLst>
+          </p:cNvPr>
+          <p:cNvSpPr>
+            <a:spLocks noGrp="1"/>
+          </p:cNvSpPr>
+          <p:nvPr>
+            <p:ph type="sldNum" sz="quarter" idx="12"/>
+          </p:nvPr>
+        </p:nvSpPr>
+        <p:spPr>
+          <a:xfrm>
+            <a:off x="3957002" y="380102"/>
+            <a:ext cx="583661" cy="550444"/>
+          </a:xfrm>
+          <a:extLst>
+            <a:ext uri="{909E8E84-426E-40dd-AFC4-6F175D3DCCD1}">
+              <a14:hiddenFill xmlns:a14="http://schemas.microsoft.com/office/drawing/2010/main" xmlns="">
+                <a:solidFill>
+                  <a:srgbClr val="FFFFFF"/>
+                </a:solidFill>
+              </a14:hiddenFill>
+            </a:ext>
+            <a:ext uri="{91240B29-F687-4f45-9708-019B960494DF}">
+              <a14:hiddenLine xmlns:a14="http://schemas.microsoft.com/office/drawing/2010/main" xmlns="" w="9525">
+                <a:solidFill>
+                  <a:srgbClr val="000000"/>
+                </a:solidFill>
+                <a:miter lim="800000"/>
+                <a:headEnd/>
+                <a:tailEnd/>
+              </a14:hiddenLine>
+            </a:ext>
+          </a:extLst>
+        </p:spPr>
+        <p:txBody>
+          <a:bodyPr wrap="square" anchor="t">
+            <a:normAutofit/>
+          </a:bodyPr>
+          <a:lstStyle>
+            <a:lvl1pPr>
+              <a:defRPr sz="1412">
+                <a:solidFill>
+                  <a:schemeClr val="tx1"/>
+                </a:solidFill>
+                <a:latin typeface="Tahoma" charset="0"/>
+                <a:ea typeface="ＭＳ Ｐゴシック" charset="0"/>
+                <a:cs typeface="ＭＳ Ｐゴシック" charset="0"/>
+              </a:defRPr>
+            </a:lvl1pPr>
+            <a:lvl2pPr marL="374595" indent="-144075">
+              <a:defRPr sz="1412">
+                <a:solidFill>
+                  <a:schemeClr val="tx1"/>
+                </a:solidFill>
+                <a:latin typeface="Tahoma" charset="0"/>
+                <a:ea typeface="ＭＳ Ｐゴシック" charset="0"/>
+              </a:defRPr>
+            </a:lvl2pPr>
+            <a:lvl3pPr marL="576301" indent="-115260">
+              <a:defRPr sz="1412">
+                <a:solidFill>
+                  <a:schemeClr val="tx1"/>
+                </a:solidFill>
+                <a:latin typeface="Tahoma" charset="0"/>
+                <a:ea typeface="ＭＳ Ｐゴシック" charset="0"/>
+              </a:defRPr>
+            </a:lvl3pPr>
+            <a:lvl4pPr marL="806821" indent="-115260">
+              <a:defRPr sz="1412">
+                <a:solidFill>
+                  <a:schemeClr val="tx1"/>
+                </a:solidFill>
+                <a:latin typeface="Tahoma" charset="0"/>
+                <a:ea typeface="ＭＳ Ｐゴシック" charset="0"/>
+              </a:defRPr>
+            </a:lvl4pPr>
+            <a:lvl5pPr marL="1037341" indent="-115260">
+              <a:defRPr sz="1412">
+                <a:solidFill>
+                  <a:schemeClr val="tx1"/>
+                </a:solidFill>
+                <a:latin typeface="Tahoma" charset="0"/>
+                <a:ea typeface="ＭＳ Ｐゴシック" charset="0"/>
+              </a:defRPr>
+            </a:lvl5pPr>
+            <a:lvl6pPr marL="1267861" indent="-115260" eaLnBrk="0" fontAlgn="base" hangingPunct="0">
+              <a:spcBef>
+                <a:spcPct val="0"/>
+              </a:spcBef>
+              <a:spcAft>
+                <a:spcPct val="0"/>
+              </a:spcAft>
+              <a:defRPr sz="1412">
+                <a:solidFill>
+                  <a:schemeClr val="tx1"/>
+                </a:solidFill>
+                <a:latin typeface="Tahoma" charset="0"/>
+                <a:ea typeface="ＭＳ Ｐゴシック" charset="0"/>
+              </a:defRPr>
+            </a:lvl6pPr>
+            <a:lvl7pPr marL="1498382" indent="-115260" eaLnBrk="0" fontAlgn="base" hangingPunct="0">
+              <a:spcBef>
+                <a:spcPct val="0"/>
+              </a:spcBef>
+              <a:spcAft>
+                <a:spcPct val="0"/>
+              </a:spcAft>
+              <a:defRPr sz="1412">
+                <a:solidFill>
+                  <a:schemeClr val="tx1"/>
+                </a:solidFill>
+                <a:latin typeface="Tahoma" charset="0"/>
+                <a:ea typeface="ＭＳ Ｐゴシック" charset="0"/>
+              </a:defRPr>
+            </a:lvl7pPr>
+            <a:lvl8pPr marL="1728902" indent="-115260" eaLnBrk="0" fontAlgn="base" hangingPunct="0">
+              <a:spcBef>
+                <a:spcPct val="0"/>
+              </a:spcBef>
+              <a:spcAft>
+                <a:spcPct val="0"/>
+              </a:spcAft>
+              <a:defRPr sz="1412">
+                <a:solidFill>
+                  <a:schemeClr val="tx1"/>
+                </a:solidFill>
+                <a:latin typeface="Tahoma" charset="0"/>
+                <a:ea typeface="ＭＳ Ｐゴシック" charset="0"/>
+              </a:defRPr>
+            </a:lvl8pPr>
+            <a:lvl9pPr marL="1959422" indent="-115260" eaLnBrk="0" fontAlgn="base" hangingPunct="0">
+              <a:spcBef>
+                <a:spcPct val="0"/>
+              </a:spcBef>
+              <a:spcAft>
+                <a:spcPct val="0"/>
+              </a:spcAft>
+              <a:defRPr sz="1412">
+                <a:solidFill>
+                  <a:schemeClr val="tx1"/>
+                </a:solidFill>
+                <a:latin typeface="Tahoma" charset="0"/>
+                <a:ea typeface="ＭＳ Ｐゴシック" charset="0"/>
+              </a:defRPr>
+            </a:lvl9pPr>
+          </a:lstStyle>
+          <a:p>
+            <a:pPr>
+              <a:spcAft>
+                <a:spcPts val="303"/>
+              </a:spcAft>
+            </a:pPr>
+            <a:fld id="{CC73A6B6-49ED-C641-8D95-0A84FA800C15}" type="slidenum">
+              <a:rPr lang="en-US" sz="706"/>
+              <a:pPr>
+                <a:spcAft>
+                  <a:spcPts val="303"/>
+                </a:spcAft>
+              </a:pPr>
+              <a:t>11</a:t>
+            </a:fld>
+            <a:endParaRPr lang="en-US" sz="706" dirty="0"/>
+          </a:p>
+        </p:txBody>
+      </p:sp>
+    </p:spTree>
+    <p:extLst>
+      <p:ext uri="{BB962C8B-B14F-4D97-AF65-F5344CB8AC3E}">
+        <p14:creationId xmlns:p14="http://schemas.microsoft.com/office/powerpoint/2010/main" val="1496491430"/>
+      </p:ext>
+    </p:extLst>
+  </p:cSld>
+  <p:clrMapOvr>
+    <a:masterClrMapping/>
+  </p:clrMapOvr>
+  <p:timing>
+    <p:tnLst>
+      <p:par>
+        <p:cTn id="1" dur="indefinite" restart="never" nodeType="tmRoot">
+          <p:childTnLst>
+            <p:seq concurrent="1" nextAc="seek">
+              <p:cTn id="2" dur="indefinite" nodeType="mainSeq">
+                <p:childTnLst>
+                  <p:par>
+                    <p:cTn id="3" fill="hold">
+                      <p:stCondLst>
+                        <p:cond delay="indefinite"/>
+                      </p:stCondLst>
+                      <p:childTnLst>
+                        <p:par>
+                          <p:cTn id="4" fill="hold">
+                            <p:stCondLst>
+                              <p:cond delay="0"/>
+                            </p:stCondLst>
+                            <p:childTnLst>
+                              <p:par>
+                                <p:cTn id="5" presetID="2" presetClass="entr" presetSubtype="4" fill="hold" grpId="0" nodeType="clickEffect">
+                                  <p:stCondLst>
+                                    <p:cond delay="0"/>
+                                  </p:stCondLst>
+                                  <p:childTnLst>
+                                    <p:set>
+                                      <p:cBhvr>
+                                        <p:cTn id="6" dur="1" fill="hold">
+                                          <p:stCondLst>
+                                            <p:cond delay="0"/>
+                                          </p:stCondLst>
+                                        </p:cTn>
+                                        <p:tgtEl>
+                                          <p:spTgt spid="4"/>
+                                        </p:tgtEl>
+                                        <p:attrNameLst>
+                                          <p:attrName>style.visibility</p:attrName>
+                                        </p:attrNameLst>
+                                      </p:cBhvr>
+                                      <p:to>
+                                        <p:strVal val="visible"/>
+                                      </p:to>
+                                    </p:set>
+                                    <p:anim calcmode="lin" valueType="num">
+                                      <p:cBhvr additive="base">
+                                        <p:cTn id="7" dur="500" fill="hold"/>
+                                        <p:tgtEl>
+                                          <p:spTgt spid="4"/>
+                                        </p:tgtEl>
+                                        <p:attrNameLst>
+                                          <p:attrName>ppt_x</p:attrName>
+                                        </p:attrNameLst>
+                                      </p:cBhvr>
+                                      <p:tavLst>
+                                        <p:tav tm="0">
+                                          <p:val>
+                                            <p:strVal val="#ppt_x"/>
+                                          </p:val>
+                                        </p:tav>
+                                        <p:tav tm="100000">
+                                          <p:val>
+                                            <p:strVal val="#ppt_x"/>
+                                          </p:val>
+                                        </p:tav>
+                                      </p:tavLst>
+                                    </p:anim>
+                                    <p:anim calcmode="lin" valueType="num">
+                                      <p:cBhvr additive="base">
+                                        <p:cTn id="8" dur="500" fill="hold"/>
+                                        <p:tgtEl>
+                                          <p:spTgt spid="4"/>
+                                        </p:tgtEl>
+                                        <p:attrNameLst>
+                                          <p:attrName>ppt_y</p:attrName>
+                                        </p:attrNameLst>
+                                      </p:cBhvr>
+                                      <p:tavLst>
+                                        <p:tav tm="0">
+                                          <p:val>
+                                            <p:strVal val="1+#ppt_h/2"/>
+                                          </p:val>
+                                        </p:tav>
+                                        <p:tav tm="100000">
+                                          <p:val>
+                                            <p:strVal val="#ppt_y"/>
+                                          </p:val>
+                                        </p:tav>
+                                      </p:tavLst>
+                                    </p:anim>
+                                  </p:childTnLst>
+                                </p:cTn>
+                              </p:par>
+                              <p:par>
+                                <p:cTn id="9" presetID="2" presetClass="entr" presetSubtype="4" fill="hold" grpId="0" nodeType="withEffect">
+                                  <p:stCondLst>
+                                    <p:cond delay="0"/>
+                                  </p:stCondLst>
+                                  <p:childTnLst>
+                                    <p:set>
+                                      <p:cBhvr>
+                                        <p:cTn id="10" dur="1" fill="hold">
+                                          <p:stCondLst>
+                                            <p:cond delay="0"/>
+                                          </p:stCondLst>
+                                        </p:cTn>
+                                        <p:tgtEl>
+                                          <p:spTgt spid="8"/>
+                                        </p:tgtEl>
+                                        <p:attrNameLst>
+                                          <p:attrName>style.visibility</p:attrName>
+                                        </p:attrNameLst>
+                                      </p:cBhvr>
+                                      <p:to>
+                                        <p:strVal val="visible"/>
+                                      </p:to>
+                                    </p:set>
+                                    <p:anim calcmode="lin" valueType="num">
+                                      <p:cBhvr additive="base">
+                                        <p:cTn id="11" dur="500" fill="hold"/>
+                                        <p:tgtEl>
+                                          <p:spTgt spid="8"/>
+                                        </p:tgtEl>
+                                        <p:attrNameLst>
+                                          <p:attrName>ppt_x</p:attrName>
+                                        </p:attrNameLst>
+                                      </p:cBhvr>
+                                      <p:tavLst>
+                                        <p:tav tm="0">
+                                          <p:val>
+                                            <p:strVal val="#ppt_x"/>
+                                          </p:val>
+                                        </p:tav>
+                                        <p:tav tm="100000">
+                                          <p:val>
+                                            <p:strVal val="#ppt_x"/>
+                                          </p:val>
+                                        </p:tav>
+                                      </p:tavLst>
+                                    </p:anim>
+                                    <p:anim calcmode="lin" valueType="num">
+                                      <p:cBhvr additive="base">
+                                        <p:cTn id="12" dur="500" fill="hold"/>
+                                        <p:tgtEl>
+                                          <p:spTgt spid="8"/>
+                                        </p:tgtEl>
+                                        <p:attrNameLst>
+                                          <p:attrName>ppt_y</p:attrName>
+                                        </p:attrNameLst>
+                                      </p:cBhvr>
+                                      <p:tavLst>
+                                        <p:tav tm="0">
+                                          <p:val>
+                                            <p:strVal val="1+#ppt_h/2"/>
+                                          </p:val>
+                                        </p:tav>
+                                        <p:tav tm="100000">
+                                          <p:val>
+                                            <p:strVal val="#ppt_y"/>
+                                          </p:val>
+                                        </p:tav>
+                                      </p:tavLst>
+                                    </p:anim>
+                                  </p:childTnLst>
+                                </p:cTn>
+                              </p:par>
+                            </p:childTnLst>
+                          </p:cTn>
+                        </p:par>
+                      </p:childTnLst>
+                    </p:cTn>
+                  </p:par>
+                  <p:par>
+                    <p:cTn id="13" fill="hold">
+                      <p:stCondLst>
+                        <p:cond delay="indefinite"/>
+                      </p:stCondLst>
+                      <p:childTnLst>
+                        <p:par>
+                          <p:cTn id="14" fill="hold">
+                            <p:stCondLst>
+                              <p:cond delay="0"/>
+                            </p:stCondLst>
+                            <p:childTnLst>
+                              <p:par>
+                                <p:cTn id="15" presetID="2" presetClass="entr" presetSubtype="4" fill="hold" grpId="0" nodeType="clickEffect">
+                                  <p:stCondLst>
+                                    <p:cond delay="0"/>
+                                  </p:stCondLst>
+                                  <p:childTnLst>
+                                    <p:set>
+                                      <p:cBhvr>
+                                        <p:cTn id="16" dur="1" fill="hold">
+                                          <p:stCondLst>
+                                            <p:cond delay="0"/>
+                                          </p:stCondLst>
+                                        </p:cTn>
+                                        <p:tgtEl>
+                                          <p:spTgt spid="7"/>
+                                        </p:tgtEl>
+                                        <p:attrNameLst>
+                                          <p:attrName>style.visibility</p:attrName>
+                                        </p:attrNameLst>
+                                      </p:cBhvr>
+                                      <p:to>
+                                        <p:strVal val="visible"/>
+                                      </p:to>
+                                    </p:set>
+                                    <p:anim calcmode="lin" valueType="num">
+                                      <p:cBhvr additive="base">
+                                        <p:cTn id="17" dur="500" fill="hold"/>
+                                        <p:tgtEl>
+                                          <p:spTgt spid="7"/>
+                                        </p:tgtEl>
+                                        <p:attrNameLst>
+                                          <p:attrName>ppt_x</p:attrName>
+                                        </p:attrNameLst>
+                                      </p:cBhvr>
+                                      <p:tavLst>
+                                        <p:tav tm="0">
+                                          <p:val>
+                                            <p:strVal val="#ppt_x"/>
+                                          </p:val>
+                                        </p:tav>
+                                        <p:tav tm="100000">
+                                          <p:val>
+                                            <p:strVal val="#ppt_x"/>
+                                          </p:val>
+                                        </p:tav>
+                                      </p:tavLst>
+                                    </p:anim>
+                                    <p:anim calcmode="lin" valueType="num">
+                                      <p:cBhvr additive="base">
+                                        <p:cTn id="18" dur="500" fill="hold"/>
+                                        <p:tgtEl>
+                                          <p:spTgt spid="7"/>
+                                        </p:tgtEl>
+                                        <p:attrNameLst>
+                                          <p:attrName>ppt_y</p:attrName>
+                                        </p:attrNameLst>
+                                      </p:cBhvr>
+                                      <p:tavLst>
+                                        <p:tav tm="0">
+                                          <p:val>
+                                            <p:strVal val="1+#ppt_h/2"/>
+                                          </p:val>
+                                        </p:tav>
+                                        <p:tav tm="100000">
+                                          <p:val>
+                                            <p:strVal val="#ppt_y"/>
+                                          </p:val>
+                                        </p:tav>
+                                      </p:tavLst>
+                                    </p:anim>
+                                  </p:childTnLst>
+                                </p:cTn>
+                              </p:par>
+                              <p:par>
+                                <p:cTn id="19" presetID="2" presetClass="entr" presetSubtype="4" fill="hold" grpId="0" nodeType="withEffect">
+                                  <p:stCondLst>
+                                    <p:cond delay="0"/>
+                                  </p:stCondLst>
+                                  <p:childTnLst>
+                                    <p:set>
+                                      <p:cBhvr>
+                                        <p:cTn id="20" dur="1" fill="hold">
+                                          <p:stCondLst>
+                                            <p:cond delay="0"/>
+                                          </p:stCondLst>
+                                        </p:cTn>
+                                        <p:tgtEl>
+                                          <p:spTgt spid="9"/>
+                                        </p:tgtEl>
+                                        <p:attrNameLst>
+                                          <p:attrName>style.visibility</p:attrName>
+                                        </p:attrNameLst>
+                                      </p:cBhvr>
+                                      <p:to>
+                                        <p:strVal val="visible"/>
+                                      </p:to>
+                                    </p:set>
+                                    <p:anim calcmode="lin" valueType="num">
+                                      <p:cBhvr additive="base">
+                                        <p:cTn id="21" dur="500" fill="hold"/>
+                                        <p:tgtEl>
+                                          <p:spTgt spid="9"/>
+                                        </p:tgtEl>
+                                        <p:attrNameLst>
+                                          <p:attrName>ppt_x</p:attrName>
+                                        </p:attrNameLst>
+                                      </p:cBhvr>
+                                      <p:tavLst>
+                                        <p:tav tm="0">
+                                          <p:val>
+                                            <p:strVal val="#ppt_x"/>
+                                          </p:val>
+                                        </p:tav>
+                                        <p:tav tm="100000">
+                                          <p:val>
+                                            <p:strVal val="#ppt_x"/>
+                                          </p:val>
+                                        </p:tav>
+                                      </p:tavLst>
+                                    </p:anim>
+                                    <p:anim calcmode="lin" valueType="num">
+                                      <p:cBhvr additive="base">
+                                        <p:cTn id="22" dur="500" fill="hold"/>
+                                        <p:tgtEl>
+                                          <p:spTgt spid="9"/>
+                                        </p:tgtEl>
+                                        <p:attrNameLst>
+                                          <p:attrName>ppt_y</p:attrName>
+                                        </p:attrNameLst>
+                                      </p:cBhvr>
+                                      <p:tavLst>
+                                        <p:tav tm="0">
+                                          <p:val>
+                                            <p:strVal val="1+#ppt_h/2"/>
+                                          </p:val>
+                                        </p:tav>
+                                        <p:tav tm="100000">
+                                          <p:val>
+                                            <p:strVal val="#ppt_y"/>
+                                          </p:val>
+                                        </p:tav>
+                                      </p:tavLst>
+                                    </p:anim>
+                                  </p:childTnLst>
+                                </p:cTn>
+                              </p:par>
+                            </p:childTnLst>
+                          </p:cTn>
+                        </p:par>
+                      </p:childTnLst>
+                    </p:cTn>
+                  </p:par>
+                </p:childTnLst>
+              </p:cTn>
+              <p:prevCondLst>
+                <p:cond evt="onPrev" delay="0">
+                  <p:tgtEl>
+                    <p:sldTgt/>
+                  </p:tgtEl>
+                </p:cond>
+              </p:prevCondLst>
+              <p:nextCondLst>
+                <p:cond evt="onNext" delay="0">
+                  <p:tgtEl>
+                    <p:sldTgt/>
+                  </p:tgtEl>
+                </p:cond>
+              </p:nextCondLst>
+            </p:seq>
+          </p:childTnLst>
+        </p:cTn>
+      </p:par>
+    </p:tnLst>
+    <p:bldLst>
+      <p:bldP spid="4" grpId="0" animBg="1"/>
+      <p:bldP spid="7" grpId="0" animBg="1"/>
+      <p:bldP spid="8" grpId="0" animBg="1"/>
+      <p:bldP spid="9" grpId="0" animBg="1"/>
+    </p:bldLst>
+  </p:timing>
+</p:sld>
+</file>
+
+<file path=ppt/slides/slide12.xml><?xml version="1.0" encoding="utf-8"?>
+<p:sld xmlns:a="http://schemas.openxmlformats.org/drawingml/2006/main" xmlns:r="http://schemas.openxmlformats.org/officeDocument/2006/relationships" xmlns:p="http://schemas.openxmlformats.org/presentationml/2006/main">
+  <p:cSld>
+    <p:spTree>
+      <p:nvGrpSpPr>
+        <p:cNvPr id="1" name=""/>
+        <p:cNvGrpSpPr/>
+        <p:nvPr/>
+      </p:nvGrpSpPr>
+      <p:grpSpPr>
+        <a:xfrm>
+          <a:off x="0" y="0"/>
+          <a:ext cx="0" cy="0"/>
+          <a:chOff x="0" y="0"/>
+          <a:chExt cx="0" cy="0"/>
+        </a:xfrm>
+      </p:grpSpPr>
+      <p:sp>
+        <p:nvSpPr>
+          <p:cNvPr id="4" name="Title 1">
+            <a:extLst>
+              <a:ext uri="{FF2B5EF4-FFF2-40B4-BE49-F238E27FC236}">
+                <a16:creationId xmlns:a16="http://schemas.microsoft.com/office/drawing/2014/main" id="{017D84B5-FF47-E9C2-FDE8-4932BBFD3022}"/>
+              </a:ext>
+            </a:extLst>
+          </p:cNvPr>
+          <p:cNvSpPr>
+            <a:spLocks noGrp="1"/>
+          </p:cNvSpPr>
+          <p:nvPr>
+            <p:ph type="title"/>
+          </p:nvPr>
+        </p:nvSpPr>
+        <p:spPr/>
+        <p:txBody>
+          <a:bodyPr/>
+          <a:lstStyle/>
+          <a:p>
+            <a:r>
+              <a:rPr lang="en-US" sz="2000" b="1" dirty="0"/>
+              <a:t>if expression and lambdas</a:t>
+            </a:r>
+            <a:endParaRPr lang="en-US" dirty="0"/>
+          </a:p>
+        </p:txBody>
+      </p:sp>
+      <p:sp>
+        <p:nvSpPr>
+          <p:cNvPr id="6" name="TextBox 5">
+            <a:extLst>
+              <a:ext uri="{FF2B5EF4-FFF2-40B4-BE49-F238E27FC236}">
+                <a16:creationId xmlns:a16="http://schemas.microsoft.com/office/drawing/2014/main" id="{207BFC10-6ED4-1F9D-60A4-4F8996BC1387}"/>
+              </a:ext>
+            </a:extLst>
+          </p:cNvPr>
+          <p:cNvSpPr txBox="1"/>
+          <p:nvPr/>
+        </p:nvSpPr>
+        <p:spPr>
+          <a:xfrm>
+            <a:off x="850524" y="1120775"/>
+            <a:ext cx="2309190" cy="2092881"/>
+          </a:xfrm>
+          <a:prstGeom prst="rect">
+            <a:avLst/>
+          </a:prstGeom>
+          <a:solidFill>
+            <a:schemeClr val="accent4"/>
+          </a:solidFill>
+          <a:ln>
+            <a:solidFill>
+              <a:schemeClr val="accent1">
+                <a:shade val="15000"/>
+              </a:schemeClr>
+            </a:solidFill>
+          </a:ln>
+        </p:spPr>
+        <p:txBody>
+          <a:bodyPr wrap="square">
+            <a:spAutoFit/>
+          </a:bodyPr>
+          <a:lstStyle/>
+          <a:p>
+            <a:r>
+              <a:rPr lang="en-US" sz="1000" dirty="0"/>
+              <a:t>(</a:t>
+            </a:r>
+            <a:r>
+              <a:rPr lang="en-US" sz="1000" dirty="0" err="1"/>
+              <a:t>λx.λy.body</a:t>
+            </a:r>
+            <a:r>
+              <a:rPr lang="en-US" sz="1000" dirty="0"/>
+              <a:t>) 3 4</a:t>
+            </a:r>
+          </a:p>
+          <a:p>
+            <a:r>
+              <a:rPr lang="en-US" sz="1000" dirty="0"/>
+              <a:t>      │</a:t>
+            </a:r>
+          </a:p>
+          <a:p>
+            <a:r>
+              <a:rPr lang="en-US" sz="1000" dirty="0"/>
+              <a:t>      │ β-reduce (x := 3)</a:t>
+            </a:r>
+          </a:p>
+          <a:p>
+            <a:r>
+              <a:rPr lang="en-US" sz="1000" dirty="0"/>
+              <a:t>      ▼</a:t>
+            </a:r>
+          </a:p>
+          <a:p>
+            <a:r>
+              <a:rPr lang="en-US" sz="1000" dirty="0"/>
+              <a:t>   </a:t>
+            </a:r>
+            <a:r>
+              <a:rPr lang="en-US" sz="1000" dirty="0" err="1"/>
+              <a:t>λy.body</a:t>
+            </a:r>
+            <a:r>
+              <a:rPr lang="en-US" sz="1000" dirty="0"/>
+              <a:t>[x := 3]</a:t>
+            </a:r>
+          </a:p>
+          <a:p>
+            <a:r>
+              <a:rPr lang="en-US" sz="1000" dirty="0"/>
+              <a:t>      │</a:t>
+            </a:r>
+          </a:p>
+          <a:p>
+            <a:r>
+              <a:rPr lang="en-US" sz="1000" dirty="0"/>
+              <a:t>      │ β-reduce (y := 4)</a:t>
+            </a:r>
+          </a:p>
+          <a:p>
+            <a:r>
+              <a:rPr lang="en-US" sz="1000" dirty="0"/>
+              <a:t>      ▼</a:t>
+            </a:r>
+          </a:p>
+          <a:p>
+            <a:r>
+              <a:rPr lang="en-US" sz="1000" dirty="0"/>
+              <a:t>   body[x := 3, y := 4]</a:t>
+            </a:r>
+          </a:p>
+          <a:p>
+            <a:r>
+              <a:rPr lang="en-US" sz="1000" dirty="0"/>
+              <a:t>      │</a:t>
+            </a:r>
+          </a:p>
+          <a:p>
+            <a:r>
+              <a:rPr lang="en-US" sz="1000" dirty="0"/>
+              <a:t>      │ evaluate if-expression</a:t>
+            </a:r>
+          </a:p>
+          <a:p>
+            <a:r>
+              <a:rPr lang="en-US" sz="1000" dirty="0"/>
+              <a:t>      ▼</a:t>
+            </a:r>
+          </a:p>
+          <a:p>
+            <a:r>
+              <a:rPr lang="en-US" sz="1000" dirty="0"/>
+              <a:t>     value</a:t>
+            </a:r>
+          </a:p>
+        </p:txBody>
+      </p:sp>
+      <p:sp>
+        <p:nvSpPr>
+          <p:cNvPr id="7" name="Slide Number Placeholder 2">
+            <a:extLst>
+              <a:ext uri="{FF2B5EF4-FFF2-40B4-BE49-F238E27FC236}">
+                <a16:creationId xmlns:a16="http://schemas.microsoft.com/office/drawing/2014/main" id="{E82B8A4D-7332-C48F-5B5C-D97064A52B94}"/>
+              </a:ext>
+            </a:extLst>
+          </p:cNvPr>
+          <p:cNvSpPr>
+            <a:spLocks noGrp="1"/>
+          </p:cNvSpPr>
+          <p:nvPr>
+            <p:ph type="sldNum" sz="quarter" idx="12"/>
+          </p:nvPr>
+        </p:nvSpPr>
+        <p:spPr>
+          <a:xfrm>
+            <a:off x="3957002" y="380102"/>
+            <a:ext cx="583661" cy="550444"/>
+          </a:xfrm>
+          <a:extLst>
+            <a:ext uri="{909E8E84-426E-40dd-AFC4-6F175D3DCCD1}">
+              <a14:hiddenFill xmlns:a14="http://schemas.microsoft.com/office/drawing/2010/main" xmlns="">
+                <a:solidFill>
+                  <a:srgbClr val="FFFFFF"/>
+                </a:solidFill>
+              </a14:hiddenFill>
+            </a:ext>
+            <a:ext uri="{91240B29-F687-4f45-9708-019B960494DF}">
+              <a14:hiddenLine xmlns:a14="http://schemas.microsoft.com/office/drawing/2010/main" xmlns="" w="9525">
+                <a:solidFill>
+                  <a:srgbClr val="000000"/>
+                </a:solidFill>
+                <a:miter lim="800000"/>
+                <a:headEnd/>
+                <a:tailEnd/>
+              </a14:hiddenLine>
+            </a:ext>
+          </a:extLst>
+        </p:spPr>
+        <p:txBody>
+          <a:bodyPr wrap="square" anchor="t">
+            <a:normAutofit/>
+          </a:bodyPr>
+          <a:lstStyle>
+            <a:lvl1pPr>
+              <a:defRPr sz="1412">
+                <a:solidFill>
+                  <a:schemeClr val="tx1"/>
+                </a:solidFill>
+                <a:latin typeface="Tahoma" charset="0"/>
+                <a:ea typeface="ＭＳ Ｐゴシック" charset="0"/>
+                <a:cs typeface="ＭＳ Ｐゴシック" charset="0"/>
+              </a:defRPr>
+            </a:lvl1pPr>
+            <a:lvl2pPr marL="374595" indent="-144075">
+              <a:defRPr sz="1412">
+                <a:solidFill>
+                  <a:schemeClr val="tx1"/>
+                </a:solidFill>
+                <a:latin typeface="Tahoma" charset="0"/>
+                <a:ea typeface="ＭＳ Ｐゴシック" charset="0"/>
+              </a:defRPr>
+            </a:lvl2pPr>
+            <a:lvl3pPr marL="576301" indent="-115260">
+              <a:defRPr sz="1412">
+                <a:solidFill>
+                  <a:schemeClr val="tx1"/>
+                </a:solidFill>
+                <a:latin typeface="Tahoma" charset="0"/>
+                <a:ea typeface="ＭＳ Ｐゴシック" charset="0"/>
+              </a:defRPr>
+            </a:lvl3pPr>
+            <a:lvl4pPr marL="806821" indent="-115260">
+              <a:defRPr sz="1412">
+                <a:solidFill>
+                  <a:schemeClr val="tx1"/>
+                </a:solidFill>
+                <a:latin typeface="Tahoma" charset="0"/>
+                <a:ea typeface="ＭＳ Ｐゴシック" charset="0"/>
+              </a:defRPr>
+            </a:lvl4pPr>
+            <a:lvl5pPr marL="1037341" indent="-115260">
+              <a:defRPr sz="1412">
+                <a:solidFill>
+                  <a:schemeClr val="tx1"/>
+                </a:solidFill>
+                <a:latin typeface="Tahoma" charset="0"/>
+                <a:ea typeface="ＭＳ Ｐゴシック" charset="0"/>
+              </a:defRPr>
+            </a:lvl5pPr>
+            <a:lvl6pPr marL="1267861" indent="-115260" eaLnBrk="0" fontAlgn="base" hangingPunct="0">
+              <a:spcBef>
+                <a:spcPct val="0"/>
+              </a:spcBef>
+              <a:spcAft>
+                <a:spcPct val="0"/>
+              </a:spcAft>
+              <a:defRPr sz="1412">
+                <a:solidFill>
+                  <a:schemeClr val="tx1"/>
+                </a:solidFill>
+                <a:latin typeface="Tahoma" charset="0"/>
+                <a:ea typeface="ＭＳ Ｐゴシック" charset="0"/>
+              </a:defRPr>
+            </a:lvl6pPr>
+            <a:lvl7pPr marL="1498382" indent="-115260" eaLnBrk="0" fontAlgn="base" hangingPunct="0">
+              <a:spcBef>
+                <a:spcPct val="0"/>
+              </a:spcBef>
+              <a:spcAft>
+                <a:spcPct val="0"/>
+              </a:spcAft>
+              <a:defRPr sz="1412">
+                <a:solidFill>
+                  <a:schemeClr val="tx1"/>
+                </a:solidFill>
+                <a:latin typeface="Tahoma" charset="0"/>
+                <a:ea typeface="ＭＳ Ｐゴシック" charset="0"/>
+              </a:defRPr>
+            </a:lvl7pPr>
+            <a:lvl8pPr marL="1728902" indent="-115260" eaLnBrk="0" fontAlgn="base" hangingPunct="0">
+              <a:spcBef>
+                <a:spcPct val="0"/>
+              </a:spcBef>
+              <a:spcAft>
+                <a:spcPct val="0"/>
+              </a:spcAft>
+              <a:defRPr sz="1412">
+                <a:solidFill>
+                  <a:schemeClr val="tx1"/>
+                </a:solidFill>
+                <a:latin typeface="Tahoma" charset="0"/>
+                <a:ea typeface="ＭＳ Ｐゴシック" charset="0"/>
+              </a:defRPr>
+            </a:lvl8pPr>
+            <a:lvl9pPr marL="1959422" indent="-115260" eaLnBrk="0" fontAlgn="base" hangingPunct="0">
+              <a:spcBef>
+                <a:spcPct val="0"/>
+              </a:spcBef>
+              <a:spcAft>
+                <a:spcPct val="0"/>
+              </a:spcAft>
+              <a:defRPr sz="1412">
+                <a:solidFill>
+                  <a:schemeClr val="tx1"/>
+                </a:solidFill>
+                <a:latin typeface="Tahoma" charset="0"/>
+                <a:ea typeface="ＭＳ Ｐゴシック" charset="0"/>
+              </a:defRPr>
+            </a:lvl9pPr>
+          </a:lstStyle>
+          <a:p>
+            <a:pPr>
+              <a:spcAft>
+                <a:spcPts val="303"/>
+              </a:spcAft>
+            </a:pPr>
+            <a:fld id="{CC73A6B6-49ED-C641-8D95-0A84FA800C15}" type="slidenum">
+              <a:rPr lang="en-US" sz="706"/>
+              <a:pPr>
+                <a:spcAft>
+                  <a:spcPts val="303"/>
+                </a:spcAft>
+              </a:pPr>
+              <a:t>12</a:t>
+            </a:fld>
+            <a:endParaRPr lang="en-US" sz="706" dirty="0"/>
+          </a:p>
+        </p:txBody>
+      </p:sp>
+    </p:spTree>
+    <p:extLst>
+      <p:ext uri="{BB962C8B-B14F-4D97-AF65-F5344CB8AC3E}">
+        <p14:creationId xmlns:p14="http://schemas.microsoft.com/office/powerpoint/2010/main" val="2930759261"/>
+      </p:ext>
+    </p:extLst>
+  </p:cSld>
+  <p:clrMapOvr>
+    <a:masterClrMapping/>
+  </p:clrMapOvr>
+</p:sld>
+</file>
+
+<file path=ppt/slides/slide13.xml><?xml version="1.0" encoding="utf-8"?>
+<p:sld xmlns:a="http://schemas.openxmlformats.org/drawingml/2006/main" xmlns:r="http://schemas.openxmlformats.org/officeDocument/2006/relationships" xmlns:p="http://schemas.openxmlformats.org/presentationml/2006/main">
+  <p:cSld>
+    <p:spTree>
+      <p:nvGrpSpPr>
+        <p:cNvPr id="1" name=""/>
+        <p:cNvGrpSpPr/>
+        <p:nvPr/>
+      </p:nvGrpSpPr>
+      <p:grpSpPr>
+        <a:xfrm>
+          <a:off x="0" y="0"/>
+          <a:ext cx="0" cy="0"/>
+          <a:chOff x="0" y="0"/>
+          <a:chExt cx="0" cy="0"/>
+        </a:xfrm>
+      </p:grpSpPr>
+      <p:sp>
+        <p:nvSpPr>
           <p:cNvPr id="2" name="object 2"/>
           <p:cNvSpPr txBox="1">
             <a:spLocks noGrp="1"/>
@@ -9101,7 +10745,7 @@
         </p:nvSpPr>
         <p:spPr>
           <a:xfrm>
-            <a:off x="268034" y="504527"/>
+            <a:off x="32165" y="507014"/>
             <a:ext cx="3477003" cy="296620"/>
           </a:xfrm>
           <a:prstGeom prst="rect">
@@ -10673,14 +12317,14 @@
           </a:xfrm>
           <a:extLst>
             <a:ext uri="{909E8E84-426E-40dd-AFC4-6F175D3DCCD1}">
-              <a14:hiddenFill xmlns="" xmlns:a14="http://schemas.microsoft.com/office/drawing/2010/main">
+              <a14:hiddenFill xmlns:a14="http://schemas.microsoft.com/office/drawing/2010/main" xmlns="">
                 <a:solidFill>
                   <a:srgbClr val="FFFFFF"/>
                 </a:solidFill>
               </a14:hiddenFill>
             </a:ext>
             <a:ext uri="{91240B29-F687-4f45-9708-019B960494DF}">
-              <a14:hiddenLine xmlns="" xmlns:a14="http://schemas.microsoft.com/office/drawing/2010/main" w="9525">
+              <a14:hiddenLine xmlns:a14="http://schemas.microsoft.com/office/drawing/2010/main" xmlns="" w="9525">
                 <a:solidFill>
                   <a:srgbClr val="000000"/>
                 </a:solidFill>
@@ -10816,7 +12460,7 @@
                   <a:spcPts val="303"/>
                 </a:spcAft>
               </a:pPr>
-              <a:t>10</a:t>
+              <a:t>13</a:t>
             </a:fld>
             <a:endParaRPr lang="en-US" sz="706" dirty="0"/>
           </a:p>
@@ -11530,7 +13174,7 @@
 </p:sld>
 </file>
 
-<file path=ppt/slides/slide11.xml><?xml version="1.0" encoding="utf-8"?>
+<file path=ppt/slides/slide14.xml><?xml version="1.0" encoding="utf-8"?>
 <p:sld xmlns:a="http://schemas.openxmlformats.org/drawingml/2006/main" xmlns:r="http://schemas.openxmlformats.org/officeDocument/2006/relationships" xmlns:p="http://schemas.openxmlformats.org/presentationml/2006/main">
   <p:cSld>
     <p:spTree>
@@ -11559,8 +13203,8 @@
         </p:nvSpPr>
         <p:spPr>
           <a:xfrm>
-            <a:off x="268034" y="490293"/>
-            <a:ext cx="3477003" cy="325089"/>
+            <a:off x="69437" y="508168"/>
+            <a:ext cx="3477003" cy="294311"/>
           </a:xfrm>
           <a:prstGeom prst="rect">
             <a:avLst/>
@@ -11581,10 +13225,10 @@
               </a:spcBef>
             </a:pPr>
             <a:r>
-              <a:rPr lang="en-IE" sz="2000" b="1" dirty="0"/>
+              <a:rPr lang="en-IE" sz="1800" b="1" dirty="0"/>
               <a:t>Variables contd.</a:t>
             </a:r>
-            <a:endParaRPr b="1" spc="215" dirty="0"/>
+            <a:endParaRPr sz="1800" b="1" spc="215" dirty="0"/>
           </a:p>
         </p:txBody>
       </p:sp>
@@ -12924,14 +14568,14 @@
           </a:xfrm>
           <a:extLst>
             <a:ext uri="{909E8E84-426E-40dd-AFC4-6F175D3DCCD1}">
-              <a14:hiddenFill xmlns="" xmlns:a14="http://schemas.microsoft.com/office/drawing/2010/main">
+              <a14:hiddenFill xmlns:a14="http://schemas.microsoft.com/office/drawing/2010/main" xmlns="">
                 <a:solidFill>
                   <a:srgbClr val="FFFFFF"/>
                 </a:solidFill>
               </a14:hiddenFill>
             </a:ext>
             <a:ext uri="{91240B29-F687-4f45-9708-019B960494DF}">
-              <a14:hiddenLine xmlns="" xmlns:a14="http://schemas.microsoft.com/office/drawing/2010/main" w="9525">
+              <a14:hiddenLine xmlns:a14="http://schemas.microsoft.com/office/drawing/2010/main" xmlns="" w="9525">
                 <a:solidFill>
                   <a:srgbClr val="000000"/>
                 </a:solidFill>
@@ -13067,7 +14711,7 @@
                   <a:spcPts val="303"/>
                 </a:spcAft>
               </a:pPr>
-              <a:t>11</a:t>
+              <a:t>14</a:t>
             </a:fld>
             <a:endParaRPr lang="en-US" sz="706" dirty="0"/>
           </a:p>
@@ -13629,7 +15273,7 @@
 </p:sld>
 </file>
 
-<file path=ppt/slides/slide12.xml><?xml version="1.0" encoding="utf-8"?>
+<file path=ppt/slides/slide15.xml><?xml version="1.0" encoding="utf-8"?>
 <p:sld xmlns:a="http://schemas.openxmlformats.org/drawingml/2006/main" xmlns:r="http://schemas.openxmlformats.org/officeDocument/2006/relationships" xmlns:p="http://schemas.openxmlformats.org/presentationml/2006/main">
   <p:cSld>
     <p:spTree>
@@ -13658,8 +15302,8 @@
         </p:nvSpPr>
         <p:spPr>
           <a:xfrm>
-            <a:off x="268034" y="490293"/>
-            <a:ext cx="3477003" cy="325089"/>
+            <a:off x="268034" y="505682"/>
+            <a:ext cx="3477003" cy="294311"/>
           </a:xfrm>
           <a:prstGeom prst="rect">
             <a:avLst/>
@@ -13680,7 +15324,7 @@
               </a:spcBef>
             </a:pPr>
             <a:r>
-              <a:rPr sz="2000" b="1" dirty="0"/>
+              <a:rPr sz="1800" b="1" dirty="0"/>
               <a:t>Multiple Arguments</a:t>
             </a:r>
           </a:p>
@@ -14055,15 +15699,14 @@
             </a:r>
           </a:p>
           <a:p>
-            <a:pPr marR="6985" algn="ctr">
+            <a:pPr marL="0" marR="6985" indent="0" algn="ctr">
               <a:lnSpc>
                 <a:spcPct val="100000"/>
               </a:lnSpc>
               <a:spcBef>
                 <a:spcPts val="930"/>
               </a:spcBef>
-              <a:buFont typeface="Wingdings" pitchFamily="2" charset="2"/>
-              <a:buChar char="q"/>
+              <a:buNone/>
             </a:pPr>
             <a:r>
               <a:rPr i="1" spc="-10" dirty="0">
@@ -14139,15 +15782,14 @@
             </a:r>
           </a:p>
           <a:p>
-            <a:pPr algn="ctr">
+            <a:pPr marL="0" indent="0" algn="ctr">
               <a:lnSpc>
                 <a:spcPct val="100000"/>
               </a:lnSpc>
               <a:spcBef>
                 <a:spcPts val="930"/>
               </a:spcBef>
-              <a:buFont typeface="Wingdings" pitchFamily="2" charset="2"/>
-              <a:buChar char="q"/>
+              <a:buNone/>
             </a:pPr>
             <a:r>
               <a:rPr i="1" spc="50" dirty="0">
@@ -14239,14 +15881,14 @@
           </a:xfrm>
           <a:extLst>
             <a:ext uri="{909E8E84-426E-40dd-AFC4-6F175D3DCCD1}">
-              <a14:hiddenFill xmlns="" xmlns:a14="http://schemas.microsoft.com/office/drawing/2010/main">
+              <a14:hiddenFill xmlns:a14="http://schemas.microsoft.com/office/drawing/2010/main" xmlns="">
                 <a:solidFill>
                   <a:srgbClr val="FFFFFF"/>
                 </a:solidFill>
               </a14:hiddenFill>
             </a:ext>
             <a:ext uri="{91240B29-F687-4f45-9708-019B960494DF}">
-              <a14:hiddenLine xmlns="" xmlns:a14="http://schemas.microsoft.com/office/drawing/2010/main" w="9525">
+              <a14:hiddenLine xmlns:a14="http://schemas.microsoft.com/office/drawing/2010/main" xmlns="" w="9525">
                 <a:solidFill>
                   <a:srgbClr val="000000"/>
                 </a:solidFill>
@@ -14382,7 +16024,7 @@
                   <a:spcPts val="303"/>
                 </a:spcAft>
               </a:pPr>
-              <a:t>12</a:t>
+              <a:t>15</a:t>
             </a:fld>
             <a:endParaRPr lang="en-US" sz="706" dirty="0"/>
           </a:p>
@@ -14805,7 +16447,7 @@
 </p:sld>
 </file>
 
-<file path=ppt/slides/slide13.xml><?xml version="1.0" encoding="utf-8"?>
+<file path=ppt/slides/slide16.xml><?xml version="1.0" encoding="utf-8"?>
 <p:sld xmlns:a="http://schemas.openxmlformats.org/drawingml/2006/main" xmlns:r="http://schemas.openxmlformats.org/officeDocument/2006/relationships" xmlns:p="http://schemas.openxmlformats.org/presentationml/2006/main">
   <p:cSld>
     <p:spTree>
@@ -14834,8 +16476,8 @@
         </p:nvSpPr>
         <p:spPr>
           <a:xfrm>
-            <a:off x="268034" y="490293"/>
-            <a:ext cx="3477003" cy="325089"/>
+            <a:off x="0" y="515542"/>
+            <a:ext cx="3477003" cy="294311"/>
           </a:xfrm>
           <a:prstGeom prst="rect">
             <a:avLst/>
@@ -14856,7 +16498,7 @@
               </a:spcBef>
             </a:pPr>
             <a:r>
-              <a:rPr sz="2000" b="1" dirty="0"/>
+              <a:rPr sz="1800" b="1" dirty="0"/>
               <a:t>Lambda Caculus in Haskell</a:t>
             </a:r>
           </a:p>
@@ -17411,14 +19053,14 @@
           </a:xfrm>
           <a:extLst>
             <a:ext uri="{909E8E84-426E-40dd-AFC4-6F175D3DCCD1}">
-              <a14:hiddenFill xmlns="" xmlns:a14="http://schemas.microsoft.com/office/drawing/2010/main">
+              <a14:hiddenFill xmlns:a14="http://schemas.microsoft.com/office/drawing/2010/main" xmlns="">
                 <a:solidFill>
                   <a:srgbClr val="FFFFFF"/>
                 </a:solidFill>
               </a14:hiddenFill>
             </a:ext>
             <a:ext uri="{91240B29-F687-4f45-9708-019B960494DF}">
-              <a14:hiddenLine xmlns="" xmlns:a14="http://schemas.microsoft.com/office/drawing/2010/main" w="9525">
+              <a14:hiddenLine xmlns:a14="http://schemas.microsoft.com/office/drawing/2010/main" xmlns="" w="9525">
                 <a:solidFill>
                   <a:srgbClr val="000000"/>
                 </a:solidFill>
@@ -17554,7 +19196,7 @@
                   <a:spcPts val="303"/>
                 </a:spcAft>
               </a:pPr>
-              <a:t>13</a:t>
+              <a:t>16</a:t>
             </a:fld>
             <a:endParaRPr lang="en-US" sz="706" dirty="0"/>
           </a:p>
@@ -17786,7 +19428,7 @@
 </p:sld>
 </file>
 
-<file path=ppt/slides/slide14.xml><?xml version="1.0" encoding="utf-8"?>
+<file path=ppt/slides/slide17.xml><?xml version="1.0" encoding="utf-8"?>
 <p:sld xmlns:a="http://schemas.openxmlformats.org/drawingml/2006/main" xmlns:r="http://schemas.openxmlformats.org/officeDocument/2006/relationships" xmlns:p="http://schemas.openxmlformats.org/presentationml/2006/main">
   <p:cSld>
     <p:spTree>
@@ -17847,14 +19489,14 @@
         <p:spPr>
           <a:extLst>
             <a:ext uri="{909E8E84-426E-40dd-AFC4-6F175D3DCCD1}">
-              <a14:hiddenFill xmlns="" xmlns:a14="http://schemas.microsoft.com/office/drawing/2010/main">
+              <a14:hiddenFill xmlns:a14="http://schemas.microsoft.com/office/drawing/2010/main" xmlns="">
                 <a:solidFill>
                   <a:srgbClr val="FFFFFF"/>
                 </a:solidFill>
               </a14:hiddenFill>
             </a:ext>
             <a:ext uri="{91240B29-F687-4f45-9708-019B960494DF}">
-              <a14:hiddenLine xmlns="" xmlns:a14="http://schemas.microsoft.com/office/drawing/2010/main" w="9525">
+              <a14:hiddenLine xmlns:a14="http://schemas.microsoft.com/office/drawing/2010/main" xmlns="" w="9525">
                 <a:solidFill>
                   <a:srgbClr val="000000"/>
                 </a:solidFill>
@@ -17990,7 +19632,7 @@
                   <a:spcPts val="303"/>
                 </a:spcAft>
               </a:pPr>
-              <a:t>14</a:t>
+              <a:t>17</a:t>
             </a:fld>
             <a:endParaRPr lang="en-US" sz="706" dirty="0"/>
           </a:p>
@@ -18305,14 +19947,14 @@
           </a:xfrm>
           <a:extLst>
             <a:ext uri="{909E8E84-426E-40dd-AFC4-6F175D3DCCD1}">
-              <a14:hiddenFill xmlns="" xmlns:a14="http://schemas.microsoft.com/office/drawing/2010/main">
+              <a14:hiddenFill xmlns:a14="http://schemas.microsoft.com/office/drawing/2010/main" xmlns="">
                 <a:solidFill>
                   <a:srgbClr val="FFFFFF"/>
                 </a:solidFill>
               </a14:hiddenFill>
             </a:ext>
             <a:ext uri="{91240B29-F687-4f45-9708-019B960494DF}">
-              <a14:hiddenLine xmlns="" xmlns:a14="http://schemas.microsoft.com/office/drawing/2010/main" w="9525">
+              <a14:hiddenLine xmlns:a14="http://schemas.microsoft.com/office/drawing/2010/main" xmlns="" w="9525">
                 <a:solidFill>
                   <a:srgbClr val="000000"/>
                 </a:solidFill>
@@ -19099,7 +20741,7 @@
           <p:cNvPr id="2" name="Title 1">
             <a:extLst>
               <a:ext uri="{FF2B5EF4-FFF2-40B4-BE49-F238E27FC236}">
-                <a16:creationId xmlns:a16="http://schemas.microsoft.com/office/drawing/2014/main" id="{59314ED0-824A-9A70-5100-C5C02A44A5D0}"/>
+                <a16:creationId xmlns:a16="http://schemas.microsoft.com/office/drawing/2014/main" id="{0144AA22-6471-5D74-6C71-E2CAAB598520}"/>
               </a:ext>
             </a:extLst>
           </p:cNvPr>
@@ -19110,66 +20752,129 @@
             <p:ph type="title"/>
           </p:nvPr>
         </p:nvSpPr>
-        <p:spPr>
-          <a:xfrm>
-            <a:off x="323850" y="380102"/>
-            <a:ext cx="3477003" cy="774073"/>
-          </a:xfrm>
-        </p:spPr>
+        <p:spPr/>
         <p:txBody>
           <a:bodyPr>
-            <a:normAutofit fontScale="90000"/>
+            <a:noAutofit/>
           </a:bodyPr>
           <a:lstStyle/>
           <a:p>
             <a:r>
-              <a:rPr lang="en-IE" sz="2000" b="1" spc="145" dirty="0"/>
+              <a:rPr lang="en-IE" sz="1800" b="1" spc="145" dirty="0"/>
               <a:t>The structure of lambda terms</a:t>
             </a:r>
-            <a:br>
-              <a:rPr lang="en-IE" sz="2000" dirty="0">
-                <a:latin typeface="Times New Roman"/>
-                <a:cs typeface="Times New Roman"/>
-              </a:rPr>
-            </a:br>
-            <a:endParaRPr lang="en-US" dirty="0"/>
+            <a:endParaRPr lang="en-US" sz="1800" dirty="0"/>
           </a:p>
         </p:txBody>
       </p:sp>
-      <p:pic>
-        <p:nvPicPr>
-          <p:cNvPr id="3" name="object 23">
+      <p:sp>
+        <p:nvSpPr>
+          <p:cNvPr id="5" name="TextBox 4">
             <a:extLst>
               <a:ext uri="{FF2B5EF4-FFF2-40B4-BE49-F238E27FC236}">
-                <a16:creationId xmlns:a16="http://schemas.microsoft.com/office/drawing/2014/main" id="{B11454B1-28DF-FB23-02AE-9254423EF3F1}"/>
+                <a16:creationId xmlns:a16="http://schemas.microsoft.com/office/drawing/2014/main" id="{AB74BB6B-6E47-AAF7-6725-858F0A4D30D8}"/>
               </a:ext>
             </a:extLst>
           </p:cNvPr>
-          <p:cNvPicPr/>
+          <p:cNvSpPr txBox="1"/>
           <p:nvPr/>
-        </p:nvPicPr>
-        <p:blipFill>
-          <a:blip r:embed="rId3" cstate="print"/>
-          <a:stretch>
-            <a:fillRect/>
-          </a:stretch>
-        </p:blipFill>
+        </p:nvSpPr>
         <p:spPr>
           <a:xfrm>
-            <a:off x="781050" y="1425575"/>
-            <a:ext cx="2332824" cy="1379590"/>
+            <a:off x="171450" y="1120775"/>
+            <a:ext cx="4038600" cy="1785104"/>
           </a:xfrm>
           <a:prstGeom prst="rect">
             <a:avLst/>
           </a:prstGeom>
+          <a:solidFill>
+            <a:schemeClr val="accent4">
+              <a:lumMod val="60000"/>
+              <a:lumOff val="40000"/>
+            </a:schemeClr>
+          </a:solidFill>
         </p:spPr>
-      </p:pic>
+        <p:txBody>
+          <a:bodyPr wrap="square">
+            <a:spAutoFit/>
+          </a:bodyPr>
+          <a:lstStyle/>
+          <a:p>
+            <a:r>
+              <a:rPr lang="en-US" sz="1100" dirty="0"/>
+              <a:t>┌─────────────── Lambda abstraction ───────┐</a:t>
+            </a:r>
+          </a:p>
+          <a:p>
+            <a:r>
+              <a:rPr lang="en-US" sz="1100" dirty="0"/>
+              <a:t>│                                                                                  │</a:t>
+            </a:r>
+          </a:p>
+          <a:p>
+            <a:r>
+              <a:rPr lang="en-US" sz="1100" dirty="0"/>
+              <a:t>│   </a:t>
+            </a:r>
+            <a:r>
+              <a:rPr lang="en-US" sz="1100" dirty="0" err="1"/>
+              <a:t>λ</a:t>
+            </a:r>
+            <a:r>
+              <a:rPr lang="en-US" sz="1100" dirty="0"/>
+              <a:t> x .       x + 1                                                          │</a:t>
+            </a:r>
+          </a:p>
+          <a:p>
+            <a:r>
+              <a:rPr lang="en-US" sz="1100" dirty="0"/>
+              <a:t>│   │ │         │                                                           │</a:t>
+            </a:r>
+          </a:p>
+          <a:p>
+            <a:r>
+              <a:rPr lang="en-US" sz="1100" dirty="0"/>
+              <a:t>│   │ │         └── Body (expression)          		│</a:t>
+            </a:r>
+          </a:p>
+          <a:p>
+            <a:r>
+              <a:rPr lang="en-US" sz="1100" dirty="0"/>
+              <a:t>│   │ │                                          ┌─ uses x 		│</a:t>
+            </a:r>
+          </a:p>
+          <a:p>
+            <a:r>
+              <a:rPr lang="en-US" sz="1100" dirty="0"/>
+              <a:t>│   │ └── Bound variable (parameter)               	│</a:t>
+            </a:r>
+          </a:p>
+          <a:p>
+            <a:r>
+              <a:rPr lang="en-US" sz="1100" dirty="0"/>
+              <a:t>│   └── Lambda symbol (introduces a function)      	│</a:t>
+            </a:r>
+          </a:p>
+          <a:p>
+            <a:r>
+              <a:rPr lang="en-US" sz="1100" dirty="0"/>
+              <a:t>│                                                  				│</a:t>
+            </a:r>
+          </a:p>
+          <a:p>
+            <a:r>
+              <a:rPr lang="en-US" sz="1100" dirty="0"/>
+              <a:t>└────────────────────────────  ───────┘</a:t>
+            </a:r>
+          </a:p>
+        </p:txBody>
+      </p:sp>
       <p:sp>
         <p:nvSpPr>
-          <p:cNvPr id="4" name="Slide Number Placeholder 2">
+          <p:cNvPr id="8" name="Slide Number Placeholder 2">
             <a:extLst>
               <a:ext uri="{FF2B5EF4-FFF2-40B4-BE49-F238E27FC236}">
-                <a16:creationId xmlns:a16="http://schemas.microsoft.com/office/drawing/2014/main" id="{CEE4671B-450C-0639-FA5F-F4679DA2DED3}"/>
+                <a16:creationId xmlns:a16="http://schemas.microsoft.com/office/drawing/2014/main" id="{4227DE8D-52A3-ACC3-2D85-7F545CFF434C}"/>
               </a:ext>
             </a:extLst>
           </p:cNvPr>
@@ -19187,14 +20892,14 @@
           </a:xfrm>
           <a:extLst>
             <a:ext uri="{909E8E84-426E-40dd-AFC4-6F175D3DCCD1}">
-              <a14:hiddenFill xmlns="" xmlns:a14="http://schemas.microsoft.com/office/drawing/2010/main">
+              <a14:hiddenFill xmlns:a14="http://schemas.microsoft.com/office/drawing/2010/main" xmlns="">
                 <a:solidFill>
                   <a:srgbClr val="FFFFFF"/>
                 </a:solidFill>
               </a14:hiddenFill>
             </a:ext>
             <a:ext uri="{91240B29-F687-4f45-9708-019B960494DF}">
-              <a14:hiddenLine xmlns="" xmlns:a14="http://schemas.microsoft.com/office/drawing/2010/main" w="9525">
+              <a14:hiddenLine xmlns:a14="http://schemas.microsoft.com/office/drawing/2010/main" xmlns="" w="9525">
                 <a:solidFill>
                   <a:srgbClr val="000000"/>
                 </a:solidFill>
@@ -19339,7 +21044,7 @@
     </p:spTree>
     <p:extLst>
       <p:ext uri="{BB962C8B-B14F-4D97-AF65-F5344CB8AC3E}">
-        <p14:creationId xmlns:p14="http://schemas.microsoft.com/office/powerpoint/2010/main" val="2797321675"/>
+        <p14:creationId xmlns:p14="http://schemas.microsoft.com/office/powerpoint/2010/main" val="3626512673"/>
       </p:ext>
     </p:extLst>
   </p:cSld>
@@ -20469,14 +22174,14 @@
           </a:xfrm>
           <a:extLst>
             <a:ext uri="{909E8E84-426E-40dd-AFC4-6F175D3DCCD1}">
-              <a14:hiddenFill xmlns="" xmlns:a14="http://schemas.microsoft.com/office/drawing/2010/main">
+              <a14:hiddenFill xmlns:a14="http://schemas.microsoft.com/office/drawing/2010/main" xmlns="">
                 <a:solidFill>
                   <a:srgbClr val="FFFFFF"/>
                 </a:solidFill>
               </a14:hiddenFill>
             </a:ext>
             <a:ext uri="{91240B29-F687-4f45-9708-019B960494DF}">
-              <a14:hiddenLine xmlns="" xmlns:a14="http://schemas.microsoft.com/office/drawing/2010/main" w="9525">
+              <a14:hiddenLine xmlns:a14="http://schemas.microsoft.com/office/drawing/2010/main" xmlns="" w="9525">
                 <a:solidFill>
                   <a:srgbClr val="000000"/>
                 </a:solidFill>
@@ -22069,14 +23774,14 @@
           </a:xfrm>
           <a:extLst>
             <a:ext uri="{909E8E84-426E-40dd-AFC4-6F175D3DCCD1}">
-              <a14:hiddenFill xmlns="" xmlns:a14="http://schemas.microsoft.com/office/drawing/2010/main">
+              <a14:hiddenFill xmlns:a14="http://schemas.microsoft.com/office/drawing/2010/main" xmlns="">
                 <a:solidFill>
                   <a:srgbClr val="FFFFFF"/>
                 </a:solidFill>
               </a14:hiddenFill>
             </a:ext>
             <a:ext uri="{91240B29-F687-4f45-9708-019B960494DF}">
-              <a14:hiddenLine xmlns="" xmlns:a14="http://schemas.microsoft.com/office/drawing/2010/main" w="9525">
+              <a14:hiddenLine xmlns:a14="http://schemas.microsoft.com/office/drawing/2010/main" xmlns="" w="9525">
                 <a:solidFill>
                   <a:srgbClr val="000000"/>
                 </a:solidFill>
@@ -22784,14 +24489,14 @@
           </a:xfrm>
           <a:extLst>
             <a:ext uri="{909E8E84-426E-40dd-AFC4-6F175D3DCCD1}">
-              <a14:hiddenFill xmlns="" xmlns:a14="http://schemas.microsoft.com/office/drawing/2010/main">
+              <a14:hiddenFill xmlns:a14="http://schemas.microsoft.com/office/drawing/2010/main" xmlns="">
                 <a:solidFill>
                   <a:srgbClr val="FFFFFF"/>
                 </a:solidFill>
               </a14:hiddenFill>
             </a:ext>
             <a:ext uri="{91240B29-F687-4f45-9708-019B960494DF}">
-              <a14:hiddenLine xmlns="" xmlns:a14="http://schemas.microsoft.com/office/drawing/2010/main" w="9525">
+              <a14:hiddenLine xmlns:a14="http://schemas.microsoft.com/office/drawing/2010/main" xmlns="" w="9525">
                 <a:solidFill>
                   <a:srgbClr val="000000"/>
                 </a:solidFill>
@@ -23909,14 +25614,14 @@
           </a:xfrm>
           <a:extLst>
             <a:ext uri="{909E8E84-426E-40dd-AFC4-6F175D3DCCD1}">
-              <a14:hiddenFill xmlns="" xmlns:a14="http://schemas.microsoft.com/office/drawing/2010/main">
+              <a14:hiddenFill xmlns:a14="http://schemas.microsoft.com/office/drawing/2010/main" xmlns="">
                 <a:solidFill>
                   <a:srgbClr val="FFFFFF"/>
                 </a:solidFill>
               </a14:hiddenFill>
             </a:ext>
             <a:ext uri="{91240B29-F687-4f45-9708-019B960494DF}">
-              <a14:hiddenLine xmlns="" xmlns:a14="http://schemas.microsoft.com/office/drawing/2010/main" w="9525">
+              <a14:hiddenLine xmlns:a14="http://schemas.microsoft.com/office/drawing/2010/main" xmlns="" w="9525">
                 <a:solidFill>
                   <a:srgbClr val="000000"/>
                 </a:solidFill>
@@ -25942,14 +27647,14 @@
           </a:xfrm>
           <a:extLst>
             <a:ext uri="{909E8E84-426E-40dd-AFC4-6F175D3DCCD1}">
-              <a14:hiddenFill xmlns="" xmlns:a14="http://schemas.microsoft.com/office/drawing/2010/main">
+              <a14:hiddenFill xmlns:a14="http://schemas.microsoft.com/office/drawing/2010/main" xmlns="">
                 <a:solidFill>
                   <a:srgbClr val="FFFFFF"/>
                 </a:solidFill>
               </a14:hiddenFill>
             </a:ext>
             <a:ext uri="{91240B29-F687-4f45-9708-019B960494DF}">
-              <a14:hiddenLine xmlns="" xmlns:a14="http://schemas.microsoft.com/office/drawing/2010/main" w="9525">
+              <a14:hiddenLine xmlns:a14="http://schemas.microsoft.com/office/drawing/2010/main" xmlns="" w="9525">
                 <a:solidFill>
                   <a:srgbClr val="000000"/>
                 </a:solidFill>
@@ -26806,8 +28511,8 @@
         </p:nvSpPr>
         <p:spPr>
           <a:xfrm>
-            <a:off x="111421" y="966068"/>
-            <a:ext cx="3806190" cy="2920287"/>
+            <a:off x="25676" y="1044575"/>
+            <a:ext cx="4632029" cy="2617640"/>
           </a:xfrm>
           <a:prstGeom prst="rect">
             <a:avLst/>
@@ -27579,132 +29284,529 @@
               </a:rPr>
               <a:t>as:</a:t>
             </a:r>
-            <a:endParaRPr sz="1000" dirty="0">
+            <a:endParaRPr lang="en-IE" sz="1000" dirty="0">
               <a:cs typeface="Arial"/>
             </a:endParaRPr>
           </a:p>
           <a:p>
-            <a:pPr marR="1381125" indent="1471295" algn="just">
+            <a:pPr marR="64769" algn="just">
+              <a:lnSpc>
+                <a:spcPct val="102600"/>
+              </a:lnSpc>
+              <a:spcBef>
+                <a:spcPts val="760"/>
+              </a:spcBef>
+            </a:pPr>
+            <a:r>
+              <a:rPr lang="en-IE" sz="1000" dirty="0">
+                <a:solidFill>
+                  <a:srgbClr val="FFFFFF"/>
+                </a:solidFill>
+                <a:latin typeface="Arial"/>
+                <a:cs typeface="Arial"/>
+              </a:rPr>
+              <a:t>		</a:t>
+            </a:r>
+            <a:r>
+              <a:rPr sz="1100" dirty="0">
+                <a:solidFill>
+                  <a:srgbClr val="FFFFFF"/>
+                </a:solidFill>
+                <a:latin typeface="Arial"/>
+                <a:cs typeface="Arial"/>
+              </a:rPr>
+              <a:t>((</a:t>
+            </a:r>
+            <a:r>
+              <a:rPr sz="1100" i="1" dirty="0">
+                <a:solidFill>
+                  <a:srgbClr val="FFFFFF"/>
+                </a:solidFill>
+                <a:latin typeface="Times New Roman"/>
+                <a:cs typeface="Times New Roman"/>
+              </a:rPr>
+              <a:t>λ</a:t>
+            </a:r>
+            <a:r>
+              <a:rPr sz="1100" i="1" dirty="0">
+                <a:solidFill>
+                  <a:srgbClr val="FFFFFF"/>
+                </a:solidFill>
+                <a:latin typeface="Arial"/>
+                <a:cs typeface="Arial"/>
+              </a:rPr>
+              <a:t>x</a:t>
+            </a:r>
+            <a:r>
+              <a:rPr sz="1100" i="1" dirty="0">
+                <a:solidFill>
+                  <a:srgbClr val="FFFFFF"/>
+                </a:solidFill>
+                <a:latin typeface="Times New Roman"/>
+                <a:cs typeface="Times New Roman"/>
+              </a:rPr>
+              <a:t>.</a:t>
+            </a:r>
+            <a:r>
+              <a:rPr sz="1100" i="1" dirty="0">
+                <a:solidFill>
+                  <a:srgbClr val="FFFFFF"/>
+                </a:solidFill>
+                <a:latin typeface="Arial"/>
+                <a:cs typeface="Arial"/>
+              </a:rPr>
+              <a:t>x</a:t>
+            </a:r>
+            <a:r>
+              <a:rPr sz="1100" i="1" spc="-5" dirty="0">
+                <a:solidFill>
+                  <a:srgbClr val="FFFFFF"/>
+                </a:solidFill>
+                <a:latin typeface="Arial"/>
+                <a:cs typeface="Arial"/>
+              </a:rPr>
+              <a:t> </a:t>
+            </a:r>
+            <a:r>
+              <a:rPr sz="1100" spc="25" dirty="0">
+                <a:solidFill>
+                  <a:srgbClr val="FFFFFF"/>
+                </a:solidFill>
+                <a:latin typeface="Arial"/>
+                <a:cs typeface="Arial"/>
+              </a:rPr>
+              <a:t>)(</a:t>
+            </a:r>
+            <a:r>
+              <a:rPr sz="1100" i="1" spc="25" dirty="0">
+                <a:solidFill>
+                  <a:srgbClr val="FFFFFF"/>
+                </a:solidFill>
+                <a:latin typeface="Times New Roman"/>
+                <a:cs typeface="Times New Roman"/>
+              </a:rPr>
+              <a:t>λ</a:t>
+            </a:r>
+            <a:r>
+              <a:rPr sz="1100" i="1" spc="25" dirty="0">
+                <a:solidFill>
+                  <a:srgbClr val="FFFFFF"/>
+                </a:solidFill>
+                <a:latin typeface="Arial"/>
+                <a:cs typeface="Arial"/>
+              </a:rPr>
+              <a:t>y</a:t>
+            </a:r>
+            <a:r>
+              <a:rPr sz="1100" i="1" spc="25" dirty="0">
+                <a:solidFill>
+                  <a:srgbClr val="FFFFFF"/>
+                </a:solidFill>
+                <a:latin typeface="Times New Roman"/>
+                <a:cs typeface="Times New Roman"/>
+              </a:rPr>
+              <a:t>.</a:t>
+            </a:r>
+            <a:r>
+              <a:rPr sz="1100" i="1" spc="25" dirty="0">
+                <a:solidFill>
+                  <a:srgbClr val="FFFFFF"/>
+                </a:solidFill>
+                <a:latin typeface="Arial"/>
+                <a:cs typeface="Arial"/>
+              </a:rPr>
+              <a:t>y</a:t>
+            </a:r>
+            <a:r>
+              <a:rPr sz="1100" i="1" spc="65" dirty="0">
+                <a:solidFill>
+                  <a:srgbClr val="FFFFFF"/>
+                </a:solidFill>
+                <a:latin typeface="Arial"/>
+                <a:cs typeface="Arial"/>
+              </a:rPr>
+              <a:t> </a:t>
+            </a:r>
+            <a:r>
+              <a:rPr sz="1100" spc="-25" dirty="0">
+                <a:solidFill>
+                  <a:srgbClr val="FFFFFF"/>
+                </a:solidFill>
+                <a:latin typeface="Arial"/>
+                <a:cs typeface="Arial"/>
+              </a:rPr>
+              <a:t>))</a:t>
+            </a:r>
+            <a:r>
+              <a:rPr sz="1100" i="1" spc="-25" dirty="0">
+                <a:solidFill>
+                  <a:srgbClr val="FFFFFF"/>
+                </a:solidFill>
+                <a:latin typeface="Arial"/>
+                <a:cs typeface="Arial"/>
+              </a:rPr>
+              <a:t>z </a:t>
+            </a:r>
+            <a:endParaRPr lang="en-IE" sz="1100" i="1" spc="-25" dirty="0">
+              <a:solidFill>
+                <a:srgbClr val="FFFFFF"/>
+              </a:solidFill>
+              <a:latin typeface="Arial"/>
+              <a:cs typeface="Arial"/>
+            </a:endParaRPr>
+          </a:p>
+          <a:p>
+            <a:pPr marR="64769" algn="just">
+              <a:lnSpc>
+                <a:spcPct val="102600"/>
+              </a:lnSpc>
+              <a:spcBef>
+                <a:spcPts val="760"/>
+              </a:spcBef>
+            </a:pPr>
+            <a:r>
+              <a:rPr lang="en-IE" sz="1100" i="1" spc="-25" dirty="0">
+                <a:solidFill>
+                  <a:srgbClr val="FFFFFF"/>
+                </a:solidFill>
+                <a:latin typeface="Arial"/>
+                <a:cs typeface="Arial"/>
+              </a:rPr>
+              <a:t> </a:t>
+            </a:r>
+            <a:r>
+              <a:rPr sz="1000" dirty="0">
+                <a:solidFill>
+                  <a:srgbClr val="FFFFFF"/>
+                </a:solidFill>
+                <a:cs typeface="Arial"/>
+              </a:rPr>
+              <a:t>The</a:t>
+            </a:r>
+            <a:r>
+              <a:rPr sz="1000" spc="-20" dirty="0">
+                <a:solidFill>
+                  <a:srgbClr val="FFFFFF"/>
+                </a:solidFill>
+                <a:cs typeface="Arial"/>
+              </a:rPr>
+              <a:t> </a:t>
+            </a:r>
+            <a:r>
+              <a:rPr sz="1000" i="1" dirty="0">
+                <a:solidFill>
+                  <a:srgbClr val="FFFFFF"/>
+                </a:solidFill>
+                <a:cs typeface="Times New Roman"/>
+              </a:rPr>
+              <a:t>β</a:t>
+            </a:r>
+            <a:r>
+              <a:rPr sz="1000" dirty="0">
+                <a:solidFill>
+                  <a:srgbClr val="FFFFFF"/>
+                </a:solidFill>
+                <a:cs typeface="Arial"/>
+              </a:rPr>
+              <a:t>-</a:t>
+            </a:r>
+            <a:r>
+              <a:rPr sz="1000" spc="-30" dirty="0">
+                <a:solidFill>
+                  <a:srgbClr val="FFFFFF"/>
+                </a:solidFill>
+                <a:cs typeface="Arial"/>
+              </a:rPr>
+              <a:t>reduction</a:t>
+            </a:r>
+            <a:r>
+              <a:rPr sz="1000" spc="5" dirty="0">
+                <a:solidFill>
+                  <a:srgbClr val="FFFFFF"/>
+                </a:solidFill>
+                <a:cs typeface="Arial"/>
+              </a:rPr>
+              <a:t> </a:t>
+            </a:r>
+            <a:r>
+              <a:rPr sz="1000" spc="-10" dirty="0">
+                <a:solidFill>
+                  <a:srgbClr val="FFFFFF"/>
+                </a:solidFill>
+                <a:cs typeface="Arial"/>
+              </a:rPr>
+              <a:t>is</a:t>
+            </a:r>
+            <a:r>
+              <a:rPr sz="1000" spc="5" dirty="0">
+                <a:solidFill>
+                  <a:srgbClr val="FFFFFF"/>
+                </a:solidFill>
+                <a:cs typeface="Arial"/>
+              </a:rPr>
+              <a:t> </a:t>
+            </a:r>
+            <a:r>
+              <a:rPr sz="1000" spc="-105" dirty="0">
+                <a:solidFill>
+                  <a:srgbClr val="FFFFFF"/>
+                </a:solidFill>
+                <a:cs typeface="Arial"/>
+              </a:rPr>
+              <a:t>as</a:t>
+            </a:r>
+            <a:r>
+              <a:rPr sz="1000" spc="30" dirty="0">
+                <a:solidFill>
+                  <a:srgbClr val="FFFFFF"/>
+                </a:solidFill>
+                <a:cs typeface="Arial"/>
+              </a:rPr>
+              <a:t> </a:t>
+            </a:r>
+            <a:r>
+              <a:rPr sz="1000" spc="-10" dirty="0">
+                <a:solidFill>
+                  <a:srgbClr val="FFFFFF"/>
+                </a:solidFill>
+                <a:cs typeface="Arial"/>
+              </a:rPr>
+              <a:t>follows</a:t>
+            </a:r>
+            <a:r>
+              <a:rPr lang="en-IE" sz="1000" spc="-10" dirty="0">
+                <a:solidFill>
+                  <a:srgbClr val="FFFFFF"/>
+                </a:solidFill>
+                <a:cs typeface="Arial"/>
+              </a:rPr>
+              <a:t>:</a:t>
+            </a:r>
+          </a:p>
+          <a:p>
+            <a:pPr marR="1381125" indent="933450" algn="just">
               <a:lnSpc>
                 <a:spcPct val="160300"/>
               </a:lnSpc>
             </a:pPr>
             <a:r>
+              <a:rPr sz="1100" spc="40" dirty="0">
+                <a:solidFill>
+                  <a:srgbClr val="FFFFFF"/>
+                </a:solidFill>
+                <a:cs typeface="Arial"/>
+              </a:rPr>
+              <a:t>((</a:t>
+            </a:r>
+            <a:r>
+              <a:rPr sz="1100" i="1" spc="40" dirty="0">
+                <a:solidFill>
+                  <a:srgbClr val="FFFFFF"/>
+                </a:solidFill>
+                <a:cs typeface="Times New Roman"/>
+              </a:rPr>
+              <a:t>λ</a:t>
+            </a:r>
+            <a:r>
+              <a:rPr sz="1100" i="1" spc="40" dirty="0">
+                <a:solidFill>
+                  <a:srgbClr val="FFFFFF"/>
+                </a:solidFill>
+                <a:cs typeface="Arial"/>
+              </a:rPr>
+              <a:t>x</a:t>
+            </a:r>
+            <a:r>
+              <a:rPr sz="1100" i="1" spc="40" dirty="0">
+                <a:solidFill>
+                  <a:srgbClr val="FFFFFF"/>
+                </a:solidFill>
+                <a:cs typeface="Times New Roman"/>
+              </a:rPr>
+              <a:t>.</a:t>
+            </a:r>
+            <a:r>
+              <a:rPr sz="1100" i="1" spc="40" dirty="0">
+                <a:solidFill>
+                  <a:srgbClr val="FFFFFF"/>
+                </a:solidFill>
+                <a:cs typeface="Arial"/>
+              </a:rPr>
+              <a:t>x</a:t>
+            </a:r>
+            <a:r>
+              <a:rPr sz="1100" i="1" spc="-180" dirty="0">
+                <a:solidFill>
+                  <a:srgbClr val="FFFFFF"/>
+                </a:solidFill>
+                <a:cs typeface="Arial"/>
+              </a:rPr>
+              <a:t> </a:t>
+            </a:r>
+            <a:r>
+              <a:rPr sz="1100" spc="50" dirty="0">
+                <a:solidFill>
+                  <a:srgbClr val="FFFFFF"/>
+                </a:solidFill>
+                <a:cs typeface="Arial"/>
+              </a:rPr>
+              <a:t>)(</a:t>
+            </a:r>
+            <a:r>
+              <a:rPr sz="1100" i="1" spc="50" dirty="0" err="1">
+                <a:solidFill>
+                  <a:srgbClr val="FFFFFF"/>
+                </a:solidFill>
+                <a:cs typeface="Times New Roman"/>
+              </a:rPr>
+              <a:t>λ</a:t>
+            </a:r>
+            <a:r>
+              <a:rPr sz="1100" i="1" spc="50" dirty="0" err="1">
+                <a:solidFill>
+                  <a:srgbClr val="FFFFFF"/>
+                </a:solidFill>
+                <a:cs typeface="Arial"/>
+              </a:rPr>
+              <a:t>y</a:t>
+            </a:r>
+            <a:r>
+              <a:rPr sz="1100" i="1" spc="50" dirty="0">
+                <a:solidFill>
+                  <a:srgbClr val="FFFFFF"/>
+                </a:solidFill>
+                <a:cs typeface="Times New Roman"/>
+              </a:rPr>
+              <a:t>.</a:t>
+            </a:r>
+            <a:r>
+              <a:rPr lang="en-IE" sz="1100" i="1" spc="50" dirty="0">
+                <a:solidFill>
+                  <a:srgbClr val="FFFFFF"/>
+                </a:solidFill>
+                <a:cs typeface="Times New Roman"/>
+              </a:rPr>
+              <a:t>y</a:t>
+            </a:r>
+            <a:r>
+              <a:rPr sz="1100" spc="-25" dirty="0">
+                <a:solidFill>
+                  <a:srgbClr val="FFFFFF"/>
+                </a:solidFill>
+                <a:cs typeface="Arial"/>
+              </a:rPr>
+              <a:t>))</a:t>
+            </a:r>
+            <a:r>
+              <a:rPr sz="1100" i="1" spc="-25" dirty="0">
+                <a:solidFill>
+                  <a:srgbClr val="FFFFFF"/>
+                </a:solidFill>
+                <a:cs typeface="Arial"/>
+              </a:rPr>
+              <a:t>z</a:t>
+            </a:r>
+            <a:r>
+              <a:rPr lang="en-IE" sz="1100" dirty="0">
+                <a:cs typeface="Arial"/>
+              </a:rPr>
+              <a:t>    </a:t>
+            </a:r>
+            <a:r>
               <a:rPr sz="1100" dirty="0">
                 <a:solidFill>
                   <a:srgbClr val="FFFFFF"/>
                 </a:solidFill>
-                <a:latin typeface="Arial"/>
-                <a:cs typeface="Arial"/>
-              </a:rPr>
-              <a:t>((</a:t>
+                <a:cs typeface="Arial"/>
+              </a:rPr>
+              <a:t>[</a:t>
             </a:r>
             <a:r>
               <a:rPr sz="1100" i="1" dirty="0">
                 <a:solidFill>
                   <a:srgbClr val="FFFFFF"/>
                 </a:solidFill>
-                <a:latin typeface="Times New Roman"/>
+                <a:cs typeface="Arial"/>
+              </a:rPr>
+              <a:t>x</a:t>
+            </a:r>
+            <a:r>
+              <a:rPr sz="1100" i="1" spc="75" dirty="0">
+                <a:solidFill>
+                  <a:srgbClr val="FFFFFF"/>
+                </a:solidFill>
+                <a:cs typeface="Arial"/>
+              </a:rPr>
+              <a:t> </a:t>
+            </a:r>
+            <a:r>
+              <a:rPr sz="1100" spc="100" dirty="0">
+                <a:solidFill>
+                  <a:srgbClr val="FFFFFF"/>
+                </a:solidFill>
+                <a:cs typeface="Arial"/>
+              </a:rPr>
+              <a:t>:=</a:t>
+            </a:r>
+            <a:r>
+              <a:rPr sz="1100" spc="-15" dirty="0">
+                <a:solidFill>
+                  <a:srgbClr val="FFFFFF"/>
+                </a:solidFill>
+                <a:cs typeface="Arial"/>
+              </a:rPr>
+              <a:t> </a:t>
+            </a:r>
+            <a:r>
+              <a:rPr sz="1100" spc="50" dirty="0">
+                <a:solidFill>
+                  <a:srgbClr val="FFFFFF"/>
+                </a:solidFill>
+                <a:cs typeface="Arial"/>
+              </a:rPr>
+              <a:t>(</a:t>
+            </a:r>
+            <a:r>
+              <a:rPr sz="1100" i="1" spc="50" dirty="0" err="1">
+                <a:solidFill>
+                  <a:srgbClr val="FFFFFF"/>
+                </a:solidFill>
                 <a:cs typeface="Times New Roman"/>
               </a:rPr>
               <a:t>λ</a:t>
             </a:r>
             <a:r>
-              <a:rPr sz="1100" i="1" dirty="0">
-                <a:solidFill>
-                  <a:srgbClr val="FFFFFF"/>
-                </a:solidFill>
-                <a:latin typeface="Arial"/>
-                <a:cs typeface="Arial"/>
-              </a:rPr>
-              <a:t>x</a:t>
-            </a:r>
-            <a:r>
-              <a:rPr sz="1100" i="1" dirty="0">
-                <a:solidFill>
-                  <a:srgbClr val="FFFFFF"/>
-                </a:solidFill>
-                <a:latin typeface="Times New Roman"/>
+              <a:rPr sz="1100" i="1" spc="50" dirty="0" err="1">
+                <a:solidFill>
+                  <a:srgbClr val="FFFFFF"/>
+                </a:solidFill>
+                <a:cs typeface="Arial"/>
+              </a:rPr>
+              <a:t>y</a:t>
+            </a:r>
+            <a:r>
+              <a:rPr sz="1100" i="1" spc="50" dirty="0" err="1">
+                <a:solidFill>
+                  <a:srgbClr val="FFFFFF"/>
+                </a:solidFill>
                 <a:cs typeface="Times New Roman"/>
               </a:rPr>
               <a:t>.</a:t>
             </a:r>
             <a:r>
-              <a:rPr sz="1100" i="1" dirty="0">
-                <a:solidFill>
-                  <a:srgbClr val="FFFFFF"/>
-                </a:solidFill>
-                <a:latin typeface="Arial"/>
-                <a:cs typeface="Arial"/>
-              </a:rPr>
-              <a:t>x</a:t>
-            </a:r>
-            <a:r>
-              <a:rPr sz="1100" i="1" spc="-5" dirty="0">
-                <a:solidFill>
-                  <a:srgbClr val="FFFFFF"/>
-                </a:solidFill>
-                <a:latin typeface="Arial"/>
-                <a:cs typeface="Arial"/>
-              </a:rPr>
-              <a:t> </a:t>
-            </a:r>
-            <a:r>
-              <a:rPr sz="1100" spc="25" dirty="0">
-                <a:solidFill>
-                  <a:srgbClr val="FFFFFF"/>
-                </a:solidFill>
-                <a:latin typeface="Arial"/>
-                <a:cs typeface="Arial"/>
-              </a:rPr>
-              <a:t>)(</a:t>
-            </a:r>
-            <a:r>
-              <a:rPr sz="1100" i="1" spc="25" dirty="0">
-                <a:solidFill>
-                  <a:srgbClr val="FFFFFF"/>
-                </a:solidFill>
-                <a:latin typeface="Times New Roman"/>
-                <a:cs typeface="Times New Roman"/>
-              </a:rPr>
-              <a:t>λ</a:t>
-            </a:r>
-            <a:r>
-              <a:rPr sz="1100" i="1" spc="25" dirty="0">
-                <a:solidFill>
-                  <a:srgbClr val="FFFFFF"/>
-                </a:solidFill>
-                <a:latin typeface="Arial"/>
+              <a:rPr sz="1100" i="1" spc="50" dirty="0" err="1">
+                <a:solidFill>
+                  <a:srgbClr val="FFFFFF"/>
+                </a:solidFill>
                 <a:cs typeface="Arial"/>
               </a:rPr>
               <a:t>y</a:t>
             </a:r>
             <a:r>
-              <a:rPr sz="1100" i="1" spc="25" dirty="0">
-                <a:solidFill>
-                  <a:srgbClr val="FFFFFF"/>
-                </a:solidFill>
-                <a:latin typeface="Times New Roman"/>
-                <a:cs typeface="Times New Roman"/>
-              </a:rPr>
-              <a:t>.</a:t>
-            </a:r>
-            <a:r>
-              <a:rPr sz="1100" i="1" spc="25" dirty="0">
-                <a:solidFill>
-                  <a:srgbClr val="FFFFFF"/>
-                </a:solidFill>
-                <a:latin typeface="Arial"/>
-                <a:cs typeface="Arial"/>
-              </a:rPr>
-              <a:t>y</a:t>
-            </a:r>
-            <a:r>
-              <a:rPr sz="1100" i="1" spc="65" dirty="0">
-                <a:solidFill>
-                  <a:srgbClr val="FFFFFF"/>
-                </a:solidFill>
-                <a:latin typeface="Arial"/>
+              <a:rPr sz="1100" i="1" spc="-190" dirty="0">
+                <a:solidFill>
+                  <a:srgbClr val="FFFFFF"/>
+                </a:solidFill>
                 <a:cs typeface="Arial"/>
               </a:rPr>
               <a:t> </a:t>
@@ -27714,147 +29816,40 @@
                 <a:solidFill>
                   <a:srgbClr val="FFFFFF"/>
                 </a:solidFill>
-                <a:latin typeface="Arial"/>
-                <a:cs typeface="Arial"/>
-              </a:rPr>
-              <a:t>))</a:t>
-            </a:r>
-            <a:r>
-              <a:rPr sz="1100" i="1" spc="-25" dirty="0">
-                <a:solidFill>
-                  <a:srgbClr val="FFFFFF"/>
-                </a:solidFill>
-                <a:latin typeface="Arial"/>
-                <a:cs typeface="Arial"/>
-              </a:rPr>
-              <a:t>z </a:t>
-            </a:r>
-            <a:r>
-              <a:rPr sz="1000" dirty="0">
-                <a:solidFill>
-                  <a:srgbClr val="FFFFFF"/>
-                </a:solidFill>
-                <a:cs typeface="Arial"/>
-              </a:rPr>
-              <a:t>The</a:t>
-            </a:r>
-            <a:r>
-              <a:rPr sz="1000" spc="-20" dirty="0">
-                <a:solidFill>
-                  <a:srgbClr val="FFFFFF"/>
-                </a:solidFill>
-                <a:cs typeface="Arial"/>
-              </a:rPr>
-              <a:t> </a:t>
-            </a:r>
-            <a:r>
-              <a:rPr sz="1000" i="1" dirty="0">
-                <a:solidFill>
-                  <a:srgbClr val="FFFFFF"/>
-                </a:solidFill>
-                <a:cs typeface="Times New Roman"/>
-              </a:rPr>
-              <a:t>β</a:t>
-            </a:r>
-            <a:r>
-              <a:rPr sz="1000" dirty="0">
-                <a:solidFill>
-                  <a:srgbClr val="FFFFFF"/>
-                </a:solidFill>
-                <a:cs typeface="Arial"/>
-              </a:rPr>
-              <a:t>-</a:t>
-            </a:r>
-            <a:r>
-              <a:rPr sz="1000" spc="-30" dirty="0">
-                <a:solidFill>
-                  <a:srgbClr val="FFFFFF"/>
-                </a:solidFill>
-                <a:cs typeface="Arial"/>
-              </a:rPr>
-              <a:t>reduction</a:t>
-            </a:r>
-            <a:r>
-              <a:rPr sz="1000" spc="5" dirty="0">
-                <a:solidFill>
-                  <a:srgbClr val="FFFFFF"/>
-                </a:solidFill>
-                <a:cs typeface="Arial"/>
-              </a:rPr>
-              <a:t> </a:t>
-            </a:r>
-            <a:r>
-              <a:rPr sz="1000" spc="-10" dirty="0">
-                <a:solidFill>
-                  <a:srgbClr val="FFFFFF"/>
-                </a:solidFill>
-                <a:cs typeface="Arial"/>
-              </a:rPr>
-              <a:t>is</a:t>
-            </a:r>
-            <a:r>
-              <a:rPr sz="1000" spc="5" dirty="0">
-                <a:solidFill>
-                  <a:srgbClr val="FFFFFF"/>
-                </a:solidFill>
-                <a:cs typeface="Arial"/>
-              </a:rPr>
-              <a:t> </a:t>
-            </a:r>
-            <a:r>
-              <a:rPr sz="1000" spc="-105" dirty="0">
-                <a:solidFill>
-                  <a:srgbClr val="FFFFFF"/>
-                </a:solidFill>
-                <a:cs typeface="Arial"/>
-              </a:rPr>
-              <a:t>as</a:t>
-            </a:r>
-            <a:r>
-              <a:rPr sz="1000" spc="30" dirty="0">
-                <a:solidFill>
-                  <a:srgbClr val="FFFFFF"/>
-                </a:solidFill>
-                <a:cs typeface="Arial"/>
-              </a:rPr>
-              <a:t> </a:t>
-            </a:r>
-            <a:r>
-              <a:rPr sz="1000" spc="-10" dirty="0">
-                <a:solidFill>
-                  <a:srgbClr val="FFFFFF"/>
-                </a:solidFill>
-                <a:cs typeface="Arial"/>
-              </a:rPr>
-              <a:t>follows</a:t>
-            </a:r>
-            <a:r>
-              <a:rPr lang="en-IE" sz="1000" spc="-10" dirty="0">
-                <a:solidFill>
-                  <a:srgbClr val="FFFFFF"/>
-                </a:solidFill>
-                <a:cs typeface="Arial"/>
-              </a:rPr>
-              <a:t>:</a:t>
-            </a:r>
+                <a:cs typeface="Arial"/>
+              </a:rPr>
+              <a:t>)]</a:t>
+            </a:r>
+            <a:endParaRPr lang="en-IE" sz="1100" dirty="0">
+              <a:cs typeface="Arial"/>
+            </a:endParaRPr>
           </a:p>
           <a:p>
-            <a:pPr marR="1381125" indent="1377950" algn="just">
+            <a:pPr marR="1381125" indent="933450" algn="just">
               <a:lnSpc>
                 <a:spcPct val="160300"/>
               </a:lnSpc>
             </a:pPr>
             <a:r>
-              <a:rPr sz="1100" spc="40" dirty="0">
-                <a:solidFill>
-                  <a:srgbClr val="FFFFFF"/>
-                </a:solidFill>
-                <a:cs typeface="Arial"/>
-              </a:rPr>
-              <a:t>((</a:t>
-            </a:r>
-            <a:r>
-              <a:rPr sz="1100" i="1" spc="40" dirty="0">
+              <a:rPr lang="en-IE" sz="1100" spc="50" dirty="0">
+                <a:solidFill>
+                  <a:srgbClr val="FFFFFF"/>
+                </a:solidFill>
+                <a:cs typeface="Arial"/>
+              </a:rPr>
+              <a:t> </a:t>
+            </a:r>
+            <a:r>
+              <a:rPr sz="1100" spc="50" dirty="0">
+                <a:solidFill>
+                  <a:srgbClr val="FFFFFF"/>
+                </a:solidFill>
+                <a:cs typeface="Arial"/>
+              </a:rPr>
+              <a:t>(</a:t>
+            </a:r>
+            <a:r>
+              <a:rPr sz="1100" i="1" spc="50" dirty="0" err="1">
                 <a:solidFill>
                   <a:srgbClr val="FFFFFF"/>
                 </a:solidFill>
@@ -27863,16 +29858,16 @@
               <a:t>λ</a:t>
             </a:r>
             <a:r>
-              <a:rPr sz="1100" i="1" spc="40" dirty="0">
-                <a:solidFill>
-                  <a:srgbClr val="FFFFFF"/>
-                </a:solidFill>
-                <a:cs typeface="Arial"/>
-              </a:rPr>
-              <a:t>x</a:t>
-            </a:r>
-            <a:r>
-              <a:rPr sz="1100" i="1" spc="40" dirty="0">
+              <a:rPr sz="1100" i="1" spc="50" dirty="0" err="1">
+                <a:solidFill>
+                  <a:srgbClr val="FFFFFF"/>
+                </a:solidFill>
+                <a:cs typeface="Arial"/>
+              </a:rPr>
+              <a:t>y</a:t>
+            </a:r>
+            <a:r>
+              <a:rPr sz="1100" i="1" spc="50" dirty="0" err="1">
                 <a:solidFill>
                   <a:srgbClr val="FFFFFF"/>
                 </a:solidFill>
@@ -27881,79 +29876,94 @@
               <a:t>.</a:t>
             </a:r>
             <a:r>
-              <a:rPr sz="1100" i="1" spc="40" dirty="0">
-                <a:solidFill>
-                  <a:srgbClr val="FFFFFF"/>
-                </a:solidFill>
-                <a:cs typeface="Arial"/>
-              </a:rPr>
-              <a:t>x</a:t>
-            </a:r>
-            <a:r>
-              <a:rPr sz="1100" i="1" spc="-180" dirty="0">
-                <a:solidFill>
-                  <a:srgbClr val="FFFFFF"/>
-                </a:solidFill>
-                <a:cs typeface="Arial"/>
-              </a:rPr>
-              <a:t> </a:t>
-            </a:r>
-            <a:r>
-              <a:rPr sz="1100" spc="50" dirty="0">
-                <a:solidFill>
-                  <a:srgbClr val="FFFFFF"/>
-                </a:solidFill>
-                <a:cs typeface="Arial"/>
-              </a:rPr>
-              <a:t>)(</a:t>
-            </a:r>
-            <a:r>
               <a:rPr sz="1100" i="1" spc="50" dirty="0" err="1">
                 <a:solidFill>
                   <a:srgbClr val="FFFFFF"/>
                 </a:solidFill>
-                <a:cs typeface="Times New Roman"/>
-              </a:rPr>
-              <a:t>λ</a:t>
-            </a:r>
-            <a:r>
-              <a:rPr sz="1100" i="1" spc="50" dirty="0" err="1">
-                <a:solidFill>
-                  <a:srgbClr val="FFFFFF"/>
-                </a:solidFill>
                 <a:cs typeface="Arial"/>
               </a:rPr>
               <a:t>y</a:t>
             </a:r>
             <a:r>
-              <a:rPr sz="1100" i="1" spc="50" dirty="0">
-                <a:solidFill>
-                  <a:srgbClr val="FFFFFF"/>
-                </a:solidFill>
-                <a:cs typeface="Times New Roman"/>
-              </a:rPr>
-              <a:t>.</a:t>
-            </a:r>
-            <a:r>
-              <a:rPr lang="en-IE" sz="1100" i="1" spc="50" dirty="0">
-                <a:solidFill>
-                  <a:srgbClr val="FFFFFF"/>
-                </a:solidFill>
-                <a:cs typeface="Times New Roman"/>
+              <a:rPr sz="1100" i="1" spc="-185" dirty="0">
+                <a:solidFill>
+                  <a:srgbClr val="FFFFFF"/>
+                </a:solidFill>
+                <a:cs typeface="Arial"/>
+              </a:rPr>
+              <a:t> </a:t>
+            </a:r>
+            <a:r>
+              <a:rPr sz="1100" spc="-25" dirty="0">
+                <a:solidFill>
+                  <a:srgbClr val="FFFFFF"/>
+                </a:solidFill>
+                <a:cs typeface="Arial"/>
+              </a:rPr>
+              <a:t>)</a:t>
+            </a:r>
+            <a:r>
+              <a:rPr sz="1100" i="1" spc="-25" dirty="0">
+                <a:solidFill>
+                  <a:srgbClr val="FFFFFF"/>
+                </a:solidFill>
+                <a:cs typeface="Arial"/>
+              </a:rPr>
+              <a:t>z</a:t>
+            </a:r>
+            <a:r>
+              <a:rPr lang="en-IE" sz="1100" dirty="0">
+                <a:cs typeface="Arial"/>
+              </a:rPr>
+              <a:t>.    </a:t>
+            </a:r>
+            <a:r>
+              <a:rPr sz="1100" dirty="0">
+                <a:solidFill>
+                  <a:srgbClr val="FFFFFF"/>
+                </a:solidFill>
+                <a:cs typeface="Arial"/>
+              </a:rPr>
+              <a:t>[</a:t>
+            </a:r>
+            <a:r>
+              <a:rPr sz="1100" i="1" dirty="0">
+                <a:solidFill>
+                  <a:srgbClr val="FFFFFF"/>
+                </a:solidFill>
+                <a:cs typeface="Arial"/>
               </a:rPr>
               <a:t>y</a:t>
             </a:r>
             <a:r>
-              <a:rPr sz="1100" spc="-25" dirty="0">
-                <a:solidFill>
-                  <a:srgbClr val="FFFFFF"/>
-                </a:solidFill>
-                <a:cs typeface="Arial"/>
-              </a:rPr>
-              <a:t>))</a:t>
-            </a:r>
-            <a:r>
-              <a:rPr sz="1100" i="1" spc="-25" dirty="0">
+              <a:rPr sz="1100" i="1" spc="100" dirty="0">
+                <a:solidFill>
+                  <a:srgbClr val="FFFFFF"/>
+                </a:solidFill>
+                <a:cs typeface="Arial"/>
+              </a:rPr>
+              <a:t> </a:t>
+            </a:r>
+            <a:r>
+              <a:rPr sz="1100" spc="100" dirty="0">
+                <a:solidFill>
+                  <a:srgbClr val="FFFFFF"/>
+                </a:solidFill>
+                <a:cs typeface="Arial"/>
+              </a:rPr>
+              <a:t>:=</a:t>
+            </a:r>
+            <a:r>
+              <a:rPr sz="1100" spc="-15" dirty="0">
+                <a:solidFill>
+                  <a:srgbClr val="FFFFFF"/>
+                </a:solidFill>
+                <a:cs typeface="Arial"/>
+              </a:rPr>
+              <a:t> </a:t>
+            </a:r>
+            <a:r>
+              <a:rPr sz="1100" i="1" spc="-85" dirty="0">
                 <a:solidFill>
                   <a:srgbClr val="FFFFFF"/>
                 </a:solidFill>
@@ -27961,205 +29971,45 @@
               </a:rPr>
               <a:t>z</a:t>
             </a:r>
-            <a:endParaRPr sz="1100" dirty="0">
+            <a:r>
+              <a:rPr sz="1100" i="1" spc="-210" dirty="0">
+                <a:solidFill>
+                  <a:srgbClr val="FFFFFF"/>
+                </a:solidFill>
+                <a:cs typeface="Arial"/>
+              </a:rPr>
+              <a:t> </a:t>
+            </a:r>
+            <a:r>
+              <a:rPr sz="1100" spc="-50" dirty="0">
+                <a:solidFill>
+                  <a:srgbClr val="FFFFFF"/>
+                </a:solidFill>
+                <a:cs typeface="Arial"/>
+              </a:rPr>
+              <a:t>]</a:t>
+            </a:r>
+            <a:endParaRPr lang="en-IE" sz="1100" dirty="0">
               <a:cs typeface="Arial"/>
             </a:endParaRPr>
           </a:p>
           <a:p>
-            <a:pPr marR="1358265" algn="r">
+            <a:pPr marR="1381125" indent="933450" algn="just">
               <a:lnSpc>
-                <a:spcPct val="100000"/>
+                <a:spcPct val="160300"/>
               </a:lnSpc>
-              <a:spcBef>
-                <a:spcPts val="35"/>
-              </a:spcBef>
             </a:pPr>
             <a:r>
-              <a:rPr sz="1100" dirty="0">
-                <a:solidFill>
-                  <a:srgbClr val="FFFFFF"/>
-                </a:solidFill>
-                <a:cs typeface="Arial"/>
-              </a:rPr>
-              <a:t>[</a:t>
-            </a:r>
-            <a:r>
-              <a:rPr sz="1100" i="1" dirty="0">
-                <a:solidFill>
-                  <a:srgbClr val="FFFFFF"/>
-                </a:solidFill>
-                <a:cs typeface="Arial"/>
-              </a:rPr>
-              <a:t>x</a:t>
-            </a:r>
-            <a:r>
-              <a:rPr sz="1100" i="1" spc="75" dirty="0">
-                <a:solidFill>
-                  <a:srgbClr val="FFFFFF"/>
-                </a:solidFill>
-                <a:cs typeface="Arial"/>
-              </a:rPr>
-              <a:t> </a:t>
-            </a:r>
-            <a:r>
-              <a:rPr sz="1100" spc="100" dirty="0">
-                <a:solidFill>
-                  <a:srgbClr val="FFFFFF"/>
-                </a:solidFill>
-                <a:cs typeface="Arial"/>
-              </a:rPr>
-              <a:t>:=</a:t>
-            </a:r>
-            <a:r>
-              <a:rPr sz="1100" spc="-15" dirty="0">
-                <a:solidFill>
-                  <a:srgbClr val="FFFFFF"/>
-                </a:solidFill>
-                <a:cs typeface="Arial"/>
-              </a:rPr>
-              <a:t> </a:t>
-            </a:r>
-            <a:r>
-              <a:rPr sz="1100" spc="50" dirty="0">
-                <a:solidFill>
-                  <a:srgbClr val="FFFFFF"/>
-                </a:solidFill>
-                <a:cs typeface="Arial"/>
-              </a:rPr>
-              <a:t>(</a:t>
-            </a:r>
-            <a:r>
-              <a:rPr sz="1100" i="1" spc="50" dirty="0">
-                <a:solidFill>
-                  <a:srgbClr val="FFFFFF"/>
-                </a:solidFill>
-                <a:cs typeface="Times New Roman"/>
-              </a:rPr>
-              <a:t>λ</a:t>
-            </a:r>
-            <a:r>
-              <a:rPr sz="1100" i="1" spc="50" dirty="0">
-                <a:solidFill>
-                  <a:srgbClr val="FFFFFF"/>
-                </a:solidFill>
-                <a:cs typeface="Arial"/>
-              </a:rPr>
-              <a:t>y</a:t>
-            </a:r>
-            <a:r>
-              <a:rPr sz="1100" i="1" spc="50" dirty="0">
-                <a:solidFill>
-                  <a:srgbClr val="FFFFFF"/>
-                </a:solidFill>
-                <a:cs typeface="Times New Roman"/>
-              </a:rPr>
-              <a:t>.</a:t>
-            </a:r>
-            <a:r>
-              <a:rPr sz="1100" i="1" spc="50" dirty="0">
-                <a:solidFill>
-                  <a:srgbClr val="FFFFFF"/>
-                </a:solidFill>
-                <a:cs typeface="Arial"/>
-              </a:rPr>
-              <a:t>y</a:t>
-            </a:r>
-            <a:r>
-              <a:rPr sz="1100" i="1" spc="-190" dirty="0">
-                <a:solidFill>
-                  <a:srgbClr val="FFFFFF"/>
-                </a:solidFill>
-                <a:cs typeface="Arial"/>
-              </a:rPr>
-              <a:t> </a:t>
-            </a:r>
-            <a:r>
-              <a:rPr sz="1100" spc="-25" dirty="0">
-                <a:solidFill>
-                  <a:srgbClr val="FFFFFF"/>
-                </a:solidFill>
-                <a:cs typeface="Arial"/>
-              </a:rPr>
-              <a:t>)]</a:t>
-            </a:r>
-            <a:endParaRPr sz="1100" dirty="0">
-              <a:cs typeface="Arial"/>
-            </a:endParaRPr>
-          </a:p>
-          <a:p>
-            <a:pPr marR="1359535" algn="r">
-              <a:lnSpc>
-                <a:spcPct val="100000"/>
-              </a:lnSpc>
-              <a:spcBef>
-                <a:spcPts val="35"/>
-              </a:spcBef>
-            </a:pPr>
-            <a:r>
-              <a:rPr sz="1100" spc="50" dirty="0">
-                <a:solidFill>
-                  <a:srgbClr val="FFFFFF"/>
-                </a:solidFill>
-                <a:cs typeface="Arial"/>
-              </a:rPr>
-              <a:t>(</a:t>
-            </a:r>
-            <a:r>
-              <a:rPr sz="1100" i="1" spc="50" dirty="0">
-                <a:solidFill>
-                  <a:srgbClr val="FFFFFF"/>
-                </a:solidFill>
-                <a:cs typeface="Times New Roman"/>
-              </a:rPr>
-              <a:t>λ</a:t>
-            </a:r>
-            <a:r>
-              <a:rPr sz="1100" i="1" spc="50" dirty="0">
-                <a:solidFill>
-                  <a:srgbClr val="FFFFFF"/>
-                </a:solidFill>
-                <a:cs typeface="Arial"/>
-              </a:rPr>
-              <a:t>y</a:t>
-            </a:r>
-            <a:r>
-              <a:rPr sz="1100" i="1" spc="50" dirty="0">
-                <a:solidFill>
-                  <a:srgbClr val="FFFFFF"/>
-                </a:solidFill>
-                <a:cs typeface="Times New Roman"/>
-              </a:rPr>
-              <a:t>.</a:t>
-            </a:r>
-            <a:r>
-              <a:rPr sz="1100" i="1" spc="50" dirty="0">
-                <a:solidFill>
-                  <a:srgbClr val="FFFFFF"/>
-                </a:solidFill>
-                <a:cs typeface="Arial"/>
-              </a:rPr>
-              <a:t>y</a:t>
-            </a:r>
-            <a:r>
-              <a:rPr sz="1100" i="1" spc="-185" dirty="0">
-                <a:solidFill>
-                  <a:srgbClr val="FFFFFF"/>
-                </a:solidFill>
-                <a:cs typeface="Arial"/>
-              </a:rPr>
-              <a:t> </a:t>
-            </a:r>
-            <a:r>
-              <a:rPr sz="1100" spc="-25" dirty="0">
-                <a:solidFill>
-                  <a:srgbClr val="FFFFFF"/>
-                </a:solidFill>
-                <a:cs typeface="Arial"/>
-              </a:rPr>
-              <a:t>)</a:t>
-            </a:r>
-            <a:r>
-              <a:rPr sz="1100" i="1" spc="-25" dirty="0">
+              <a:rPr lang="en-IE" sz="1100" i="1" spc="-50" dirty="0">
+                <a:solidFill>
+                  <a:srgbClr val="FFFFFF"/>
+                </a:solidFill>
+                <a:cs typeface="Arial"/>
+              </a:rPr>
+              <a:t>   </a:t>
+            </a:r>
+            <a:r>
+              <a:rPr sz="1100" i="1" spc="-50" dirty="0">
                 <a:solidFill>
                   <a:srgbClr val="FFFFFF"/>
                 </a:solidFill>
@@ -28167,114 +30017,10 @@
               </a:rPr>
               <a:t>z</a:t>
             </a:r>
-            <a:endParaRPr sz="1100" dirty="0">
-              <a:cs typeface="Arial"/>
-            </a:endParaRPr>
-          </a:p>
-          <a:p>
-            <a:pPr marR="1349375" algn="r">
-              <a:lnSpc>
-                <a:spcPct val="100000"/>
-              </a:lnSpc>
-              <a:spcBef>
-                <a:spcPts val="35"/>
-              </a:spcBef>
-            </a:pPr>
-            <a:r>
-              <a:rPr sz="1100" dirty="0">
-                <a:solidFill>
-                  <a:srgbClr val="FFFFFF"/>
-                </a:solidFill>
-                <a:cs typeface="Arial"/>
-              </a:rPr>
-              <a:t>[</a:t>
-            </a:r>
-            <a:r>
-              <a:rPr sz="1100" i="1" dirty="0">
-                <a:solidFill>
-                  <a:srgbClr val="FFFFFF"/>
-                </a:solidFill>
-                <a:cs typeface="Arial"/>
-              </a:rPr>
-              <a:t>y</a:t>
-            </a:r>
-            <a:r>
-              <a:rPr sz="1100" i="1" spc="100" dirty="0">
-                <a:solidFill>
-                  <a:srgbClr val="FFFFFF"/>
-                </a:solidFill>
-                <a:cs typeface="Arial"/>
-              </a:rPr>
-              <a:t> </a:t>
-            </a:r>
-            <a:r>
-              <a:rPr sz="1100" spc="100" dirty="0">
-                <a:solidFill>
-                  <a:srgbClr val="FFFFFF"/>
-                </a:solidFill>
-                <a:cs typeface="Arial"/>
-              </a:rPr>
-              <a:t>:=</a:t>
-            </a:r>
-            <a:r>
-              <a:rPr sz="1100" spc="-15" dirty="0">
-                <a:solidFill>
-                  <a:srgbClr val="FFFFFF"/>
-                </a:solidFill>
-                <a:cs typeface="Arial"/>
-              </a:rPr>
-              <a:t> </a:t>
-            </a:r>
-            <a:r>
-              <a:rPr sz="1100" i="1" spc="-85" dirty="0">
-                <a:solidFill>
-                  <a:srgbClr val="FFFFFF"/>
-                </a:solidFill>
-                <a:cs typeface="Arial"/>
-              </a:rPr>
-              <a:t>z</a:t>
-            </a:r>
-            <a:r>
-              <a:rPr sz="1100" i="1" spc="-210" dirty="0">
-                <a:solidFill>
-                  <a:srgbClr val="FFFFFF"/>
-                </a:solidFill>
-                <a:cs typeface="Arial"/>
-              </a:rPr>
-              <a:t> </a:t>
-            </a:r>
-            <a:r>
-              <a:rPr sz="1100" spc="-50" dirty="0">
-                <a:solidFill>
-                  <a:srgbClr val="FFFFFF"/>
-                </a:solidFill>
-                <a:cs typeface="Arial"/>
-              </a:rPr>
-              <a:t>]</a:t>
-            </a:r>
-            <a:endParaRPr sz="1100" dirty="0">
-              <a:cs typeface="Arial"/>
-            </a:endParaRPr>
-          </a:p>
-          <a:p>
-            <a:pPr marR="1360170" algn="r">
-              <a:lnSpc>
-                <a:spcPct val="100000"/>
-              </a:lnSpc>
-              <a:spcBef>
-                <a:spcPts val="35"/>
-              </a:spcBef>
-            </a:pPr>
-            <a:r>
-              <a:rPr sz="1100" i="1" spc="-50" dirty="0">
-                <a:solidFill>
-                  <a:srgbClr val="FFFFFF"/>
-                </a:solidFill>
-                <a:cs typeface="Arial"/>
-              </a:rPr>
-              <a:t>z</a:t>
-            </a:r>
-            <a:endParaRPr sz="1100" dirty="0">
+            <a:endParaRPr lang="en-IE" sz="1100" i="1" spc="-50" dirty="0">
+              <a:solidFill>
+                <a:srgbClr val="FFFFFF"/>
+              </a:solidFill>
               <a:cs typeface="Arial"/>
             </a:endParaRPr>
           </a:p>
@@ -28288,367 +30034,7 @@
               </a:spcBef>
             </a:pPr>
             <a:r>
-              <a:rPr sz="1100" spc="-50" dirty="0">
-                <a:solidFill>
-                  <a:srgbClr val="FFFFFF"/>
-                </a:solidFill>
-                <a:latin typeface="Arial"/>
-                <a:cs typeface="Arial"/>
-              </a:rPr>
-              <a:t>We</a:t>
-            </a:r>
-            <a:r>
-              <a:rPr sz="1100" spc="-25" dirty="0">
-                <a:solidFill>
-                  <a:srgbClr val="FFFFFF"/>
-                </a:solidFill>
-                <a:latin typeface="Arial"/>
-                <a:cs typeface="Arial"/>
-              </a:rPr>
-              <a:t> </a:t>
-            </a:r>
-            <a:r>
-              <a:rPr sz="1100" dirty="0">
-                <a:solidFill>
-                  <a:srgbClr val="FFFFFF"/>
-                </a:solidFill>
-                <a:latin typeface="Arial"/>
-                <a:cs typeface="Arial"/>
-              </a:rPr>
-              <a:t>can’t</a:t>
-            </a:r>
-            <a:r>
-              <a:rPr sz="1100" spc="-35" dirty="0">
-                <a:solidFill>
-                  <a:srgbClr val="FFFFFF"/>
-                </a:solidFill>
-                <a:latin typeface="Arial"/>
-                <a:cs typeface="Arial"/>
-              </a:rPr>
-              <a:t> </a:t>
-            </a:r>
-            <a:r>
-              <a:rPr sz="1100" spc="-70" dirty="0">
-                <a:solidFill>
-                  <a:srgbClr val="FFFFFF"/>
-                </a:solidFill>
-                <a:latin typeface="Arial"/>
-                <a:cs typeface="Arial"/>
-              </a:rPr>
-              <a:t>reduce</a:t>
-            </a:r>
-            <a:r>
-              <a:rPr sz="1100" spc="-5" dirty="0">
-                <a:solidFill>
-                  <a:srgbClr val="FFFFFF"/>
-                </a:solidFill>
-                <a:latin typeface="Arial"/>
-                <a:cs typeface="Arial"/>
-              </a:rPr>
-              <a:t> </a:t>
-            </a:r>
-            <a:r>
-              <a:rPr sz="1100" dirty="0">
-                <a:solidFill>
-                  <a:srgbClr val="FFFFFF"/>
-                </a:solidFill>
-                <a:latin typeface="Arial"/>
-                <a:cs typeface="Arial"/>
-              </a:rPr>
-              <a:t>this</a:t>
-            </a:r>
-            <a:r>
-              <a:rPr sz="1100" spc="-10" dirty="0">
-                <a:solidFill>
-                  <a:srgbClr val="FFFFFF"/>
-                </a:solidFill>
-                <a:latin typeface="Arial"/>
-                <a:cs typeface="Arial"/>
-              </a:rPr>
-              <a:t> </a:t>
-            </a:r>
-            <a:r>
-              <a:rPr sz="1100" spc="-40" dirty="0">
-                <a:solidFill>
-                  <a:srgbClr val="FFFFFF"/>
-                </a:solidFill>
-                <a:latin typeface="Arial"/>
-                <a:cs typeface="Arial"/>
-              </a:rPr>
-              <a:t>any</a:t>
-            </a:r>
-            <a:r>
-              <a:rPr sz="1100" spc="-5" dirty="0">
-                <a:solidFill>
-                  <a:srgbClr val="FFFFFF"/>
-                </a:solidFill>
-                <a:latin typeface="Arial"/>
-                <a:cs typeface="Arial"/>
-              </a:rPr>
-              <a:t> </a:t>
-            </a:r>
-            <a:r>
-              <a:rPr sz="1100" dirty="0">
-                <a:solidFill>
-                  <a:srgbClr val="FFFFFF"/>
-                </a:solidFill>
-                <a:latin typeface="Arial"/>
-                <a:cs typeface="Arial"/>
-              </a:rPr>
-              <a:t>further</a:t>
-            </a:r>
-            <a:r>
-              <a:rPr sz="1100" spc="-10" dirty="0">
-                <a:solidFill>
-                  <a:srgbClr val="FFFFFF"/>
-                </a:solidFill>
-                <a:latin typeface="Arial"/>
-                <a:cs typeface="Arial"/>
-              </a:rPr>
-              <a:t> </a:t>
-            </a:r>
-            <a:r>
-              <a:rPr sz="1100" spc="-105" dirty="0">
-                <a:solidFill>
-                  <a:srgbClr val="FFFFFF"/>
-                </a:solidFill>
-                <a:latin typeface="Arial"/>
-                <a:cs typeface="Arial"/>
-              </a:rPr>
-              <a:t>as</a:t>
-            </a:r>
-            <a:r>
-              <a:rPr sz="1100" spc="30" dirty="0">
-                <a:solidFill>
-                  <a:srgbClr val="FFFFFF"/>
-                </a:solidFill>
-                <a:latin typeface="Arial"/>
-                <a:cs typeface="Arial"/>
-              </a:rPr>
-              <a:t> </a:t>
-            </a:r>
-            <a:r>
-              <a:rPr sz="1100" spc="-25" dirty="0">
-                <a:solidFill>
-                  <a:srgbClr val="FFFFFF"/>
-                </a:solidFill>
-                <a:latin typeface="Arial"/>
-                <a:cs typeface="Arial"/>
-              </a:rPr>
-              <a:t>there</a:t>
-            </a:r>
-            <a:r>
-              <a:rPr sz="1100" spc="-10" dirty="0">
-                <a:solidFill>
-                  <a:srgbClr val="FFFFFF"/>
-                </a:solidFill>
-                <a:latin typeface="Arial"/>
-                <a:cs typeface="Arial"/>
-              </a:rPr>
-              <a:t> </a:t>
-            </a:r>
-            <a:r>
-              <a:rPr sz="1100" dirty="0">
-                <a:solidFill>
-                  <a:srgbClr val="FFFFFF"/>
-                </a:solidFill>
-                <a:latin typeface="Arial"/>
-                <a:cs typeface="Arial"/>
-              </a:rPr>
-              <a:t>is</a:t>
-            </a:r>
-            <a:r>
-              <a:rPr sz="1100" spc="-5" dirty="0">
-                <a:solidFill>
-                  <a:srgbClr val="FFFFFF"/>
-                </a:solidFill>
-                <a:latin typeface="Arial"/>
-                <a:cs typeface="Arial"/>
-              </a:rPr>
-              <a:t> </a:t>
-            </a:r>
-            <a:r>
-              <a:rPr sz="1100" spc="-10" dirty="0">
-                <a:solidFill>
-                  <a:srgbClr val="FFFFFF"/>
-                </a:solidFill>
-                <a:latin typeface="Arial"/>
-                <a:cs typeface="Arial"/>
-              </a:rPr>
-              <a:t>nothing </a:t>
-            </a:r>
-            <a:r>
-              <a:rPr sz="1100" dirty="0">
-                <a:solidFill>
-                  <a:srgbClr val="FFFFFF"/>
-                </a:solidFill>
-                <a:latin typeface="Arial"/>
-                <a:cs typeface="Arial"/>
-              </a:rPr>
-              <a:t>left</a:t>
-            </a:r>
-            <a:r>
-              <a:rPr sz="1100" spc="-5" dirty="0">
-                <a:solidFill>
-                  <a:srgbClr val="FFFFFF"/>
-                </a:solidFill>
-                <a:latin typeface="Arial"/>
-                <a:cs typeface="Arial"/>
-              </a:rPr>
-              <a:t> </a:t>
-            </a:r>
-            <a:r>
-              <a:rPr sz="1100" dirty="0">
-                <a:solidFill>
-                  <a:srgbClr val="FFFFFF"/>
-                </a:solidFill>
-                <a:latin typeface="Arial"/>
-                <a:cs typeface="Arial"/>
-              </a:rPr>
-              <a:t>to</a:t>
-            </a:r>
-            <a:r>
-              <a:rPr sz="1100" spc="-10" dirty="0">
-                <a:solidFill>
-                  <a:srgbClr val="FFFFFF"/>
-                </a:solidFill>
-                <a:latin typeface="Arial"/>
-                <a:cs typeface="Arial"/>
-              </a:rPr>
-              <a:t> </a:t>
-            </a:r>
-            <a:r>
-              <a:rPr sz="1100" spc="-25" dirty="0">
-                <a:solidFill>
-                  <a:srgbClr val="FFFFFF"/>
-                </a:solidFill>
-                <a:latin typeface="Arial"/>
-                <a:cs typeface="Arial"/>
-              </a:rPr>
-              <a:t>apply, </a:t>
-            </a:r>
-            <a:r>
-              <a:rPr sz="1100" spc="-45" dirty="0">
-                <a:solidFill>
-                  <a:srgbClr val="FFFFFF"/>
-                </a:solidFill>
-                <a:latin typeface="Arial"/>
-                <a:cs typeface="Arial"/>
-              </a:rPr>
-              <a:t>and</a:t>
-            </a:r>
-            <a:r>
-              <a:rPr sz="1100" spc="-30" dirty="0">
-                <a:solidFill>
-                  <a:srgbClr val="FFFFFF"/>
-                </a:solidFill>
-                <a:latin typeface="Arial"/>
-                <a:cs typeface="Arial"/>
-              </a:rPr>
-              <a:t> </a:t>
-            </a:r>
-            <a:r>
-              <a:rPr sz="1100" spc="-90" dirty="0">
-                <a:solidFill>
-                  <a:srgbClr val="FFFFFF"/>
-                </a:solidFill>
-                <a:latin typeface="Arial"/>
-                <a:cs typeface="Arial"/>
-              </a:rPr>
-              <a:t>we</a:t>
-            </a:r>
-            <a:r>
-              <a:rPr sz="1100" spc="15" dirty="0">
-                <a:solidFill>
-                  <a:srgbClr val="FFFFFF"/>
-                </a:solidFill>
-                <a:latin typeface="Arial"/>
-                <a:cs typeface="Arial"/>
-              </a:rPr>
-              <a:t> </a:t>
-            </a:r>
-            <a:r>
-              <a:rPr sz="1100" spc="-35" dirty="0">
-                <a:solidFill>
-                  <a:srgbClr val="FFFFFF"/>
-                </a:solidFill>
-                <a:latin typeface="Arial"/>
-                <a:cs typeface="Arial"/>
-              </a:rPr>
-              <a:t>know</a:t>
-            </a:r>
-            <a:r>
-              <a:rPr sz="1100" spc="-40" dirty="0">
-                <a:solidFill>
-                  <a:srgbClr val="FFFFFF"/>
-                </a:solidFill>
-                <a:latin typeface="Arial"/>
-                <a:cs typeface="Arial"/>
-              </a:rPr>
-              <a:t> </a:t>
-            </a:r>
-            <a:r>
-              <a:rPr sz="1100" spc="-10" dirty="0">
-                <a:solidFill>
-                  <a:srgbClr val="FFFFFF"/>
-                </a:solidFill>
-                <a:latin typeface="Arial"/>
-                <a:cs typeface="Arial"/>
-              </a:rPr>
-              <a:t>nothing</a:t>
-            </a:r>
-            <a:r>
-              <a:rPr sz="1100" spc="-45" dirty="0">
-                <a:solidFill>
-                  <a:srgbClr val="FFFFFF"/>
-                </a:solidFill>
-                <a:latin typeface="Arial"/>
-                <a:cs typeface="Arial"/>
-              </a:rPr>
-              <a:t> </a:t>
-            </a:r>
-            <a:r>
-              <a:rPr sz="1100" spc="-10" dirty="0">
-                <a:solidFill>
-                  <a:srgbClr val="FFFFFF"/>
-                </a:solidFill>
-                <a:latin typeface="Arial"/>
-                <a:cs typeface="Arial"/>
-              </a:rPr>
-              <a:t>about</a:t>
-            </a:r>
-            <a:r>
-              <a:rPr sz="1100" spc="-15" dirty="0">
-                <a:solidFill>
-                  <a:srgbClr val="FFFFFF"/>
-                </a:solidFill>
-                <a:latin typeface="Arial"/>
-                <a:cs typeface="Arial"/>
-              </a:rPr>
-              <a:t> </a:t>
-            </a:r>
-            <a:r>
-              <a:rPr sz="1100" i="1" spc="-85" dirty="0">
-                <a:solidFill>
-                  <a:srgbClr val="FFFFFF"/>
-                </a:solidFill>
-                <a:latin typeface="Arial"/>
-                <a:cs typeface="Arial"/>
-              </a:rPr>
-              <a:t>z</a:t>
-            </a:r>
-            <a:r>
-              <a:rPr sz="1100" i="1" spc="-210" dirty="0">
-                <a:solidFill>
-                  <a:srgbClr val="FFFFFF"/>
-                </a:solidFill>
-                <a:latin typeface="Arial"/>
-                <a:cs typeface="Arial"/>
-              </a:rPr>
-              <a:t> </a:t>
-            </a:r>
-            <a:r>
-              <a:rPr sz="1100" spc="-50" dirty="0">
+              <a:rPr lang="en-IE" sz="900" spc="-50" dirty="0">
                 <a:solidFill>
                   <a:srgbClr val="FFFFFF"/>
                 </a:solidFill>
@@ -28657,7 +30043,7 @@
               </a:rPr>
               <a:t>.</a:t>
             </a:r>
-            <a:endParaRPr sz="1100" dirty="0">
+            <a:endParaRPr lang="en-IE" sz="900" dirty="0">
               <a:latin typeface="Arial"/>
               <a:cs typeface="Arial"/>
             </a:endParaRPr>
@@ -28742,14 +30128,14 @@
           </a:xfrm>
           <a:extLst>
             <a:ext uri="{909E8E84-426E-40dd-AFC4-6F175D3DCCD1}">
-              <a14:hiddenFill xmlns="" xmlns:a14="http://schemas.microsoft.com/office/drawing/2010/main">
+              <a14:hiddenFill xmlns:a14="http://schemas.microsoft.com/office/drawing/2010/main" xmlns="">
                 <a:solidFill>
                   <a:srgbClr val="FFFFFF"/>
                 </a:solidFill>
               </a14:hiddenFill>
             </a:ext>
             <a:ext uri="{91240B29-F687-4f45-9708-019B960494DF}">
-              <a14:hiddenLine xmlns="" xmlns:a14="http://schemas.microsoft.com/office/drawing/2010/main" w="9525">
+              <a14:hiddenLine xmlns:a14="http://schemas.microsoft.com/office/drawing/2010/main" xmlns="" w="9525">
                 <a:solidFill>
                   <a:srgbClr val="000000"/>
                 </a:solidFill>
@@ -28888,6 +30274,409 @@
               <a:t>9</a:t>
             </a:fld>
             <a:endParaRPr lang="en-US" sz="706" dirty="0"/>
+          </a:p>
+        </p:txBody>
+      </p:sp>
+      <p:sp>
+        <p:nvSpPr>
+          <p:cNvPr id="2" name="Rounded Rectangular Callout 1">
+            <a:extLst>
+              <a:ext uri="{FF2B5EF4-FFF2-40B4-BE49-F238E27FC236}">
+                <a16:creationId xmlns:a16="http://schemas.microsoft.com/office/drawing/2014/main" id="{72EE0F8F-6962-F5FE-BC8F-022A1BDA6429}"/>
+              </a:ext>
+            </a:extLst>
+          </p:cNvPr>
+          <p:cNvSpPr/>
+          <p:nvPr/>
+        </p:nvSpPr>
+        <p:spPr>
+          <a:xfrm>
+            <a:off x="3009900" y="2393950"/>
+            <a:ext cx="1600200" cy="1066800"/>
+          </a:xfrm>
+          <a:prstGeom prst="wedgeRoundRectCallout">
+            <a:avLst>
+              <a:gd name="adj1" fmla="val -166175"/>
+              <a:gd name="adj2" fmla="val 35792"/>
+              <a:gd name="adj3" fmla="val 16667"/>
+            </a:avLst>
+          </a:prstGeom>
+          <a:solidFill>
+            <a:schemeClr val="accent4"/>
+          </a:solidFill>
+        </p:spPr>
+        <p:style>
+          <a:lnRef idx="2">
+            <a:schemeClr val="accent1">
+              <a:shade val="15000"/>
+            </a:schemeClr>
+          </a:lnRef>
+          <a:fillRef idx="1">
+            <a:schemeClr val="accent1"/>
+          </a:fillRef>
+          <a:effectRef idx="0">
+            <a:schemeClr val="accent1"/>
+          </a:effectRef>
+          <a:fontRef idx="minor">
+            <a:schemeClr val="lt1"/>
+          </a:fontRef>
+        </p:style>
+        <p:txBody>
+          <a:bodyPr rtlCol="0" anchor="ctr"/>
+          <a:lstStyle/>
+          <a:p>
+            <a:pPr algn="ctr"/>
+            <a:r>
+              <a:rPr lang="en-IE" sz="1100" spc="-50" dirty="0">
+                <a:solidFill>
+                  <a:srgbClr val="FFFFFF"/>
+                </a:solidFill>
+                <a:latin typeface="Arial"/>
+                <a:cs typeface="Arial"/>
+              </a:rPr>
+              <a:t>We</a:t>
+            </a:r>
+            <a:r>
+              <a:rPr lang="en-IE" sz="1100" spc="-25" dirty="0">
+                <a:solidFill>
+                  <a:srgbClr val="FFFFFF"/>
+                </a:solidFill>
+                <a:latin typeface="Arial"/>
+                <a:cs typeface="Arial"/>
+              </a:rPr>
+              <a:t> </a:t>
+            </a:r>
+            <a:r>
+              <a:rPr lang="en-IE" sz="1100" dirty="0">
+                <a:solidFill>
+                  <a:srgbClr val="FFFFFF"/>
+                </a:solidFill>
+                <a:latin typeface="Arial"/>
+                <a:cs typeface="Arial"/>
+              </a:rPr>
+              <a:t>can’t</a:t>
+            </a:r>
+            <a:r>
+              <a:rPr lang="en-IE" sz="1100" spc="-35" dirty="0">
+                <a:solidFill>
+                  <a:srgbClr val="FFFFFF"/>
+                </a:solidFill>
+                <a:latin typeface="Arial"/>
+                <a:cs typeface="Arial"/>
+              </a:rPr>
+              <a:t> </a:t>
+            </a:r>
+            <a:r>
+              <a:rPr lang="en-IE" sz="1100" spc="-70" dirty="0">
+                <a:solidFill>
+                  <a:srgbClr val="FFFFFF"/>
+                </a:solidFill>
+                <a:latin typeface="Arial"/>
+                <a:cs typeface="Arial"/>
+              </a:rPr>
+              <a:t>reduce</a:t>
+            </a:r>
+            <a:r>
+              <a:rPr lang="en-IE" sz="1100" spc="-5" dirty="0">
+                <a:solidFill>
+                  <a:srgbClr val="FFFFFF"/>
+                </a:solidFill>
+                <a:latin typeface="Arial"/>
+                <a:cs typeface="Arial"/>
+              </a:rPr>
+              <a:t> </a:t>
+            </a:r>
+            <a:r>
+              <a:rPr lang="en-IE" sz="1100" dirty="0">
+                <a:solidFill>
+                  <a:srgbClr val="FFFFFF"/>
+                </a:solidFill>
+                <a:latin typeface="Arial"/>
+                <a:cs typeface="Arial"/>
+              </a:rPr>
+              <a:t>this</a:t>
+            </a:r>
+            <a:r>
+              <a:rPr lang="en-IE" sz="1100" spc="-10" dirty="0">
+                <a:solidFill>
+                  <a:srgbClr val="FFFFFF"/>
+                </a:solidFill>
+                <a:latin typeface="Arial"/>
+                <a:cs typeface="Arial"/>
+              </a:rPr>
+              <a:t> </a:t>
+            </a:r>
+            <a:r>
+              <a:rPr lang="en-IE" sz="1100" spc="-40" dirty="0">
+                <a:solidFill>
+                  <a:srgbClr val="FFFFFF"/>
+                </a:solidFill>
+                <a:latin typeface="Arial"/>
+                <a:cs typeface="Arial"/>
+              </a:rPr>
+              <a:t>any</a:t>
+            </a:r>
+            <a:r>
+              <a:rPr lang="en-IE" sz="1100" spc="-5" dirty="0">
+                <a:solidFill>
+                  <a:srgbClr val="FFFFFF"/>
+                </a:solidFill>
+                <a:latin typeface="Arial"/>
+                <a:cs typeface="Arial"/>
+              </a:rPr>
+              <a:t> </a:t>
+            </a:r>
+            <a:r>
+              <a:rPr lang="en-IE" sz="1100" dirty="0">
+                <a:solidFill>
+                  <a:srgbClr val="FFFFFF"/>
+                </a:solidFill>
+                <a:latin typeface="Arial"/>
+                <a:cs typeface="Arial"/>
+              </a:rPr>
+              <a:t>further</a:t>
+            </a:r>
+            <a:r>
+              <a:rPr lang="en-IE" sz="1100" spc="-10" dirty="0">
+                <a:solidFill>
+                  <a:srgbClr val="FFFFFF"/>
+                </a:solidFill>
+                <a:latin typeface="Arial"/>
+                <a:cs typeface="Arial"/>
+              </a:rPr>
+              <a:t> </a:t>
+            </a:r>
+            <a:r>
+              <a:rPr lang="en-IE" sz="1100" spc="-105" dirty="0">
+                <a:solidFill>
+                  <a:srgbClr val="FFFFFF"/>
+                </a:solidFill>
+                <a:latin typeface="Arial"/>
+                <a:cs typeface="Arial"/>
+              </a:rPr>
+              <a:t>as</a:t>
+            </a:r>
+            <a:r>
+              <a:rPr lang="en-IE" sz="1100" spc="30" dirty="0">
+                <a:solidFill>
+                  <a:srgbClr val="FFFFFF"/>
+                </a:solidFill>
+                <a:latin typeface="Arial"/>
+                <a:cs typeface="Arial"/>
+              </a:rPr>
+              <a:t> </a:t>
+            </a:r>
+            <a:r>
+              <a:rPr lang="en-IE" sz="1100" spc="-25" dirty="0">
+                <a:solidFill>
+                  <a:srgbClr val="FFFFFF"/>
+                </a:solidFill>
+                <a:latin typeface="Arial"/>
+                <a:cs typeface="Arial"/>
+              </a:rPr>
+              <a:t>there</a:t>
+            </a:r>
+            <a:r>
+              <a:rPr lang="en-IE" sz="1100" spc="-10" dirty="0">
+                <a:solidFill>
+                  <a:srgbClr val="FFFFFF"/>
+                </a:solidFill>
+                <a:latin typeface="Arial"/>
+                <a:cs typeface="Arial"/>
+              </a:rPr>
+              <a:t> </a:t>
+            </a:r>
+            <a:r>
+              <a:rPr lang="en-IE" sz="1100" dirty="0">
+                <a:solidFill>
+                  <a:srgbClr val="FFFFFF"/>
+                </a:solidFill>
+                <a:latin typeface="Arial"/>
+                <a:cs typeface="Arial"/>
+              </a:rPr>
+              <a:t>is</a:t>
+            </a:r>
+            <a:r>
+              <a:rPr lang="en-IE" sz="1100" spc="-5" dirty="0">
+                <a:solidFill>
+                  <a:srgbClr val="FFFFFF"/>
+                </a:solidFill>
+                <a:latin typeface="Arial"/>
+                <a:cs typeface="Arial"/>
+              </a:rPr>
+              <a:t> </a:t>
+            </a:r>
+            <a:r>
+              <a:rPr lang="en-IE" sz="1100" spc="-10" dirty="0">
+                <a:solidFill>
+                  <a:srgbClr val="FFFFFF"/>
+                </a:solidFill>
+                <a:latin typeface="Arial"/>
+                <a:cs typeface="Arial"/>
+              </a:rPr>
+              <a:t>nothing </a:t>
+            </a:r>
+            <a:r>
+              <a:rPr lang="en-IE" sz="1100" dirty="0">
+                <a:solidFill>
+                  <a:srgbClr val="FFFFFF"/>
+                </a:solidFill>
+                <a:latin typeface="Arial"/>
+                <a:cs typeface="Arial"/>
+              </a:rPr>
+              <a:t>left</a:t>
+            </a:r>
+            <a:r>
+              <a:rPr lang="en-IE" sz="1100" spc="-5" dirty="0">
+                <a:solidFill>
+                  <a:srgbClr val="FFFFFF"/>
+                </a:solidFill>
+                <a:latin typeface="Arial"/>
+                <a:cs typeface="Arial"/>
+              </a:rPr>
+              <a:t> </a:t>
+            </a:r>
+            <a:r>
+              <a:rPr lang="en-IE" sz="1100" dirty="0">
+                <a:solidFill>
+                  <a:srgbClr val="FFFFFF"/>
+                </a:solidFill>
+                <a:latin typeface="Arial"/>
+                <a:cs typeface="Arial"/>
+              </a:rPr>
+              <a:t>to</a:t>
+            </a:r>
+            <a:r>
+              <a:rPr lang="en-IE" sz="1100" spc="-10" dirty="0">
+                <a:solidFill>
+                  <a:srgbClr val="FFFFFF"/>
+                </a:solidFill>
+                <a:latin typeface="Arial"/>
+                <a:cs typeface="Arial"/>
+              </a:rPr>
+              <a:t> </a:t>
+            </a:r>
+            <a:r>
+              <a:rPr lang="en-IE" sz="1100" spc="-25" dirty="0">
+                <a:solidFill>
+                  <a:srgbClr val="FFFFFF"/>
+                </a:solidFill>
+                <a:latin typeface="Arial"/>
+                <a:cs typeface="Arial"/>
+              </a:rPr>
+              <a:t>apply, </a:t>
+            </a:r>
+            <a:r>
+              <a:rPr lang="en-IE" sz="1100" spc="-45" dirty="0">
+                <a:solidFill>
+                  <a:srgbClr val="FFFFFF"/>
+                </a:solidFill>
+                <a:latin typeface="Arial"/>
+                <a:cs typeface="Arial"/>
+              </a:rPr>
+              <a:t>and</a:t>
+            </a:r>
+            <a:r>
+              <a:rPr lang="en-IE" sz="1100" spc="-30" dirty="0">
+                <a:solidFill>
+                  <a:srgbClr val="FFFFFF"/>
+                </a:solidFill>
+                <a:latin typeface="Arial"/>
+                <a:cs typeface="Arial"/>
+              </a:rPr>
+              <a:t> </a:t>
+            </a:r>
+            <a:r>
+              <a:rPr lang="en-IE" sz="1100" spc="-90" dirty="0">
+                <a:solidFill>
+                  <a:srgbClr val="FFFFFF"/>
+                </a:solidFill>
+                <a:latin typeface="Arial"/>
+                <a:cs typeface="Arial"/>
+              </a:rPr>
+              <a:t>we</a:t>
+            </a:r>
+            <a:r>
+              <a:rPr lang="en-IE" sz="1100" spc="15" dirty="0">
+                <a:solidFill>
+                  <a:srgbClr val="FFFFFF"/>
+                </a:solidFill>
+                <a:latin typeface="Arial"/>
+                <a:cs typeface="Arial"/>
+              </a:rPr>
+              <a:t> </a:t>
+            </a:r>
+            <a:r>
+              <a:rPr lang="en-IE" sz="1100" spc="-35" dirty="0">
+                <a:solidFill>
+                  <a:srgbClr val="FFFFFF"/>
+                </a:solidFill>
+                <a:latin typeface="Arial"/>
+                <a:cs typeface="Arial"/>
+              </a:rPr>
+              <a:t>know</a:t>
+            </a:r>
+            <a:r>
+              <a:rPr lang="en-IE" sz="1100" spc="-40" dirty="0">
+                <a:solidFill>
+                  <a:srgbClr val="FFFFFF"/>
+                </a:solidFill>
+                <a:latin typeface="Arial"/>
+                <a:cs typeface="Arial"/>
+              </a:rPr>
+              <a:t> </a:t>
+            </a:r>
+            <a:r>
+              <a:rPr lang="en-IE" sz="1100" spc="-10" dirty="0">
+                <a:solidFill>
+                  <a:srgbClr val="FFFFFF"/>
+                </a:solidFill>
+                <a:latin typeface="Arial"/>
+                <a:cs typeface="Arial"/>
+              </a:rPr>
+              <a:t>nothing</a:t>
+            </a:r>
+            <a:r>
+              <a:rPr lang="en-IE" sz="1100" spc="-45" dirty="0">
+                <a:solidFill>
+                  <a:srgbClr val="FFFFFF"/>
+                </a:solidFill>
+                <a:latin typeface="Arial"/>
+                <a:cs typeface="Arial"/>
+              </a:rPr>
+              <a:t> </a:t>
+            </a:r>
+            <a:r>
+              <a:rPr lang="en-IE" sz="1100" spc="-10" dirty="0">
+                <a:solidFill>
+                  <a:srgbClr val="FFFFFF"/>
+                </a:solidFill>
+                <a:latin typeface="Arial"/>
+                <a:cs typeface="Arial"/>
+              </a:rPr>
+              <a:t>about</a:t>
+            </a:r>
+            <a:r>
+              <a:rPr lang="en-IE" sz="1100" spc="-15" dirty="0">
+                <a:solidFill>
+                  <a:srgbClr val="FFFFFF"/>
+                </a:solidFill>
+                <a:latin typeface="Arial"/>
+                <a:cs typeface="Arial"/>
+              </a:rPr>
+              <a:t> </a:t>
+            </a:r>
+            <a:r>
+              <a:rPr lang="en-IE" sz="1100" i="1" spc="-85" dirty="0">
+                <a:solidFill>
+                  <a:srgbClr val="FFFFFF"/>
+                </a:solidFill>
+                <a:latin typeface="Arial"/>
+                <a:cs typeface="Arial"/>
+              </a:rPr>
+              <a:t>z</a:t>
+            </a:r>
+            <a:endParaRPr lang="en-US" sz="1100" dirty="0"/>
           </a:p>
         </p:txBody>
       </p:sp>
@@ -29538,7 +31327,7 @@
                             </p:stCondLst>
                             <p:childTnLst>
                               <p:par>
-                                <p:cTn id="41" presetID="2" presetClass="entr" presetSubtype="4" fill="hold" nodeType="clickEffect">
+                                <p:cTn id="41" presetID="2" presetClass="entr" presetSubtype="4" fill="hold" grpId="0" nodeType="clickEffect">
                                   <p:stCondLst>
                                     <p:cond delay="0"/>
                                   </p:stCondLst>
@@ -29551,11 +31340,7 @@
                                           </p:stCondLst>
                                         </p:cTn>
                                         <p:tgtEl>
-                                          <p:spTgt spid="3">
-                                            <p:txEl>
-                                              <p:pRg st="8" end="8"/>
-                                            </p:txEl>
-                                          </p:spTgt>
+                                          <p:spTgt spid="2"/>
                                         </p:tgtEl>
                                         <p:attrNameLst>
                                           <p:attrName>style.visibility</p:attrName>
@@ -29569,11 +31354,7 @@
                                       <p:cBhvr additive="base">
                                         <p:cTn id="43" dur="500" fill="hold"/>
                                         <p:tgtEl>
-                                          <p:spTgt spid="3">
-                                            <p:txEl>
-                                              <p:pRg st="8" end="8"/>
-                                            </p:txEl>
-                                          </p:spTgt>
+                                          <p:spTgt spid="2"/>
                                         </p:tgtEl>
                                         <p:attrNameLst>
                                           <p:attrName>ppt_x</p:attrName>
@@ -29596,11 +31377,7 @@
                                       <p:cBhvr additive="base">
                                         <p:cTn id="44" dur="500" fill="hold"/>
                                         <p:tgtEl>
-                                          <p:spTgt spid="3">
-                                            <p:txEl>
-                                              <p:pRg st="8" end="8"/>
-                                            </p:txEl>
-                                          </p:spTgt>
+                                          <p:spTgt spid="2"/>
                                         </p:tgtEl>
                                         <p:attrNameLst>
                                           <p:attrName>ppt_y</p:attrName>
@@ -29649,6 +31426,9 @@
         </p:cTn>
       </p:par>
     </p:tnLst>
+    <p:bldLst>
+      <p:bldP spid="2" grpId="0" animBg="1"/>
+    </p:bldLst>
   </p:timing>
 </p:sld>
 </file>

</xml_diff>